<commit_message>
First presentation that my colleagues can dissect
</commit_message>
<xml_diff>
--- a/New_personas.pptx
+++ b/New_personas.pptx
@@ -5,25 +5,26 @@
     <p:sldMasterId id="2147483648" r:id="rId1"/>
   </p:sldMasterIdLst>
   <p:notesMasterIdLst>
-    <p:notesMasterId r:id="rId18"/>
+    <p:notesMasterId r:id="rId19"/>
   </p:notesMasterIdLst>
   <p:sldIdLst>
     <p:sldId id="258" r:id="rId2"/>
     <p:sldId id="292" r:id="rId3"/>
     <p:sldId id="288" r:id="rId4"/>
-    <p:sldId id="286" r:id="rId5"/>
-    <p:sldId id="287" r:id="rId6"/>
-    <p:sldId id="289" r:id="rId7"/>
-    <p:sldId id="290" r:id="rId8"/>
-    <p:sldId id="285" r:id="rId9"/>
-    <p:sldId id="293" r:id="rId10"/>
-    <p:sldId id="282" r:id="rId11"/>
-    <p:sldId id="283" r:id="rId12"/>
-    <p:sldId id="279" r:id="rId13"/>
-    <p:sldId id="281" r:id="rId14"/>
-    <p:sldId id="294" r:id="rId15"/>
-    <p:sldId id="295" r:id="rId16"/>
-    <p:sldId id="291" r:id="rId17"/>
+    <p:sldId id="295" r:id="rId5"/>
+    <p:sldId id="296" r:id="rId6"/>
+    <p:sldId id="298" r:id="rId7"/>
+    <p:sldId id="286" r:id="rId8"/>
+    <p:sldId id="287" r:id="rId9"/>
+    <p:sldId id="289" r:id="rId10"/>
+    <p:sldId id="285" r:id="rId11"/>
+    <p:sldId id="297" r:id="rId12"/>
+    <p:sldId id="293" r:id="rId13"/>
+    <p:sldId id="283" r:id="rId14"/>
+    <p:sldId id="279" r:id="rId15"/>
+    <p:sldId id="281" r:id="rId16"/>
+    <p:sldId id="294" r:id="rId17"/>
+    <p:sldId id="291" r:id="rId18"/>
   </p:sldIdLst>
   <p:sldSz cx="12192000" cy="6858000"/>
   <p:notesSz cx="6858000" cy="9144000"/>
@@ -648,6 +649,93 @@
 </file>
 
 <file path=ppt/notesSlides/notesSlide3.xml><?xml version="1.0" encoding="utf-8"?>
+<p:notes xmlns:a="http://schemas.openxmlformats.org/drawingml/2006/main" xmlns:r="http://schemas.openxmlformats.org/officeDocument/2006/relationships" xmlns:p="http://schemas.openxmlformats.org/presentationml/2006/main">
+  <p:cSld>
+    <p:spTree>
+      <p:nvGrpSpPr>
+        <p:cNvPr id="1" name=""/>
+        <p:cNvGrpSpPr/>
+        <p:nvPr/>
+      </p:nvGrpSpPr>
+      <p:grpSpPr>
+        <a:xfrm>
+          <a:off x="0" y="0"/>
+          <a:ext cx="0" cy="0"/>
+          <a:chOff x="0" y="0"/>
+          <a:chExt cx="0" cy="0"/>
+        </a:xfrm>
+      </p:grpSpPr>
+      <p:sp>
+        <p:nvSpPr>
+          <p:cNvPr id="2" name="Slide Image Placeholder 1"/>
+          <p:cNvSpPr>
+            <a:spLocks noGrp="1" noRot="1" noChangeAspect="1"/>
+          </p:cNvSpPr>
+          <p:nvPr>
+            <p:ph type="sldImg"/>
+          </p:nvPr>
+        </p:nvSpPr>
+        <p:spPr/>
+      </p:sp>
+      <p:sp>
+        <p:nvSpPr>
+          <p:cNvPr id="3" name="Notes Placeholder 2"/>
+          <p:cNvSpPr>
+            <a:spLocks noGrp="1"/>
+          </p:cNvSpPr>
+          <p:nvPr>
+            <p:ph type="body" idx="1"/>
+          </p:nvPr>
+        </p:nvSpPr>
+        <p:spPr/>
+        <p:txBody>
+          <a:bodyPr/>
+          <a:lstStyle/>
+          <a:p>
+            <a:r>
+              <a:rPr lang="en-US" dirty="0"/>
+              <a:t>Based on how survey respondent answered question ##.</a:t>
+            </a:r>
+          </a:p>
+        </p:txBody>
+      </p:sp>
+      <p:sp>
+        <p:nvSpPr>
+          <p:cNvPr id="4" name="Slide Number Placeholder 3"/>
+          <p:cNvSpPr>
+            <a:spLocks noGrp="1"/>
+          </p:cNvSpPr>
+          <p:nvPr>
+            <p:ph type="sldNum" sz="quarter" idx="5"/>
+          </p:nvPr>
+        </p:nvSpPr>
+        <p:spPr/>
+        <p:txBody>
+          <a:bodyPr/>
+          <a:lstStyle/>
+          <a:p>
+            <a:fld id="{F0EC76DB-B869-5249-88B0-522B6410C2EC}" type="slidenum">
+              <a:rPr lang="en-US" smtClean="0"/>
+              <a:t>8</a:t>
+            </a:fld>
+            <a:endParaRPr lang="en-US"/>
+          </a:p>
+        </p:txBody>
+      </p:sp>
+    </p:spTree>
+    <p:extLst>
+      <p:ext uri="{BB962C8B-B14F-4D97-AF65-F5344CB8AC3E}">
+        <p14:creationId xmlns:p14="http://schemas.microsoft.com/office/powerpoint/2010/main" val="2607098557"/>
+      </p:ext>
+    </p:extLst>
+  </p:cSld>
+  <p:clrMapOvr>
+    <a:masterClrMapping/>
+  </p:clrMapOvr>
+</p:notes>
+</file>
+
+<file path=ppt/notesSlides/notesSlide4.xml><?xml version="1.0" encoding="utf-8"?>
 <p:notes xmlns:a="http://schemas.openxmlformats.org/drawingml/2006/main" xmlns:r="http://schemas.openxmlformats.org/officeDocument/2006/relationships" xmlns:p="http://schemas.openxmlformats.org/presentationml/2006/main" showMasterSp="0" showMasterPhAnim="0">
   <p:cSld>
     <p:spTree>
@@ -760,7 +848,7 @@
 </p:notes>
 </file>
 
-<file path=ppt/notesSlides/notesSlide4.xml><?xml version="1.0" encoding="utf-8"?>
+<file path=ppt/notesSlides/notesSlide5.xml><?xml version="1.0" encoding="utf-8"?>
 <p:notes xmlns:a="http://schemas.openxmlformats.org/drawingml/2006/main" xmlns:r="http://schemas.openxmlformats.org/officeDocument/2006/relationships" xmlns:p="http://schemas.openxmlformats.org/presentationml/2006/main" showMasterSp="0" showMasterPhAnim="0">
   <p:cSld>
     <p:spTree>
@@ -4947,7 +5035,7 @@
           <p:cNvPr id="2" name="Title 1">
             <a:extLst>
               <a:ext uri="{FF2B5EF4-FFF2-40B4-BE49-F238E27FC236}">
-                <a16:creationId xmlns:a16="http://schemas.microsoft.com/office/drawing/2014/main" id="{DDD69AA4-082B-9F49-AC1A-B3E0CE858FA2}"/>
+                <a16:creationId xmlns:a16="http://schemas.microsoft.com/office/drawing/2014/main" id="{2CD1A3D2-D31F-AF47-8E90-F2728D638279}"/>
               </a:ext>
             </a:extLst>
           </p:cNvPr>
@@ -4965,7 +5053,7 @@
           <a:p>
             <a:r>
               <a:rPr lang="en-US" dirty="0"/>
-              <a:t>What 2 groups have in common</a:t>
+              <a:t>Lowest entropy questions</a:t>
             </a:r>
           </a:p>
         </p:txBody>
@@ -4975,7 +5063,7 @@
           <p:cNvPr id="3" name="Content Placeholder 2">
             <a:extLst>
               <a:ext uri="{FF2B5EF4-FFF2-40B4-BE49-F238E27FC236}">
-                <a16:creationId xmlns:a16="http://schemas.microsoft.com/office/drawing/2014/main" id="{5482F4D6-E690-5B40-9FE9-F30A1826B05C}"/>
+                <a16:creationId xmlns:a16="http://schemas.microsoft.com/office/drawing/2014/main" id="{C6D4322D-0A4F-4249-8AE9-29528E3D49A9}"/>
               </a:ext>
             </a:extLst>
           </p:cNvPr>
@@ -4991,14 +5079,14 @@
           <a:bodyPr/>
           <a:lstStyle/>
           <a:p>
-            <a:endParaRPr lang="en-US"/>
+            <a:endParaRPr lang="en-US" dirty="0"/>
           </a:p>
         </p:txBody>
       </p:sp>
     </p:spTree>
     <p:extLst>
       <p:ext uri="{BB962C8B-B14F-4D97-AF65-F5344CB8AC3E}">
-        <p14:creationId xmlns:p14="http://schemas.microsoft.com/office/powerpoint/2010/main" val="1441933067"/>
+        <p14:creationId xmlns:p14="http://schemas.microsoft.com/office/powerpoint/2010/main" val="3575397538"/>
       </p:ext>
     </p:extLst>
   </p:cSld>
@@ -5009,6 +5097,172 @@
 </file>
 
 <file path=ppt/slides/slide11.xml><?xml version="1.0" encoding="utf-8"?>
+<p:sld xmlns:a="http://schemas.openxmlformats.org/drawingml/2006/main" xmlns:r="http://schemas.openxmlformats.org/officeDocument/2006/relationships" xmlns:p="http://schemas.openxmlformats.org/presentationml/2006/main">
+  <p:cSld>
+    <p:spTree>
+      <p:nvGrpSpPr>
+        <p:cNvPr id="1" name=""/>
+        <p:cNvGrpSpPr/>
+        <p:nvPr/>
+      </p:nvGrpSpPr>
+      <p:grpSpPr>
+        <a:xfrm>
+          <a:off x="0" y="0"/>
+          <a:ext cx="0" cy="0"/>
+          <a:chOff x="0" y="0"/>
+          <a:chExt cx="0" cy="0"/>
+        </a:xfrm>
+      </p:grpSpPr>
+      <p:sp>
+        <p:nvSpPr>
+          <p:cNvPr id="2" name="Title 1">
+            <a:extLst>
+              <a:ext uri="{FF2B5EF4-FFF2-40B4-BE49-F238E27FC236}">
+                <a16:creationId xmlns:a16="http://schemas.microsoft.com/office/drawing/2014/main" id="{EA7FEB16-718B-CA40-8BD5-F448737C4700}"/>
+              </a:ext>
+            </a:extLst>
+          </p:cNvPr>
+          <p:cNvSpPr>
+            <a:spLocks noGrp="1"/>
+          </p:cNvSpPr>
+          <p:nvPr>
+            <p:ph type="title"/>
+          </p:nvPr>
+        </p:nvSpPr>
+        <p:spPr/>
+        <p:txBody>
+          <a:bodyPr/>
+          <a:lstStyle/>
+          <a:p>
+            <a:r>
+              <a:rPr lang="en-US" dirty="0"/>
+              <a:t>Highest entropy questions</a:t>
+            </a:r>
+          </a:p>
+        </p:txBody>
+      </p:sp>
+      <p:sp>
+        <p:nvSpPr>
+          <p:cNvPr id="3" name="Content Placeholder 2">
+            <a:extLst>
+              <a:ext uri="{FF2B5EF4-FFF2-40B4-BE49-F238E27FC236}">
+                <a16:creationId xmlns:a16="http://schemas.microsoft.com/office/drawing/2014/main" id="{FDE6726D-26EE-C941-A643-730BC2864EAA}"/>
+              </a:ext>
+            </a:extLst>
+          </p:cNvPr>
+          <p:cNvSpPr>
+            <a:spLocks noGrp="1"/>
+          </p:cNvSpPr>
+          <p:nvPr>
+            <p:ph idx="1"/>
+          </p:nvPr>
+        </p:nvSpPr>
+        <p:spPr/>
+        <p:txBody>
+          <a:bodyPr/>
+          <a:lstStyle/>
+          <a:p>
+            <a:endParaRPr lang="en-US"/>
+          </a:p>
+        </p:txBody>
+      </p:sp>
+    </p:spTree>
+    <p:extLst>
+      <p:ext uri="{BB962C8B-B14F-4D97-AF65-F5344CB8AC3E}">
+        <p14:creationId xmlns:p14="http://schemas.microsoft.com/office/powerpoint/2010/main" val="1129492949"/>
+      </p:ext>
+    </p:extLst>
+  </p:cSld>
+  <p:clrMapOvr>
+    <a:masterClrMapping/>
+  </p:clrMapOvr>
+</p:sld>
+</file>
+
+<file path=ppt/slides/slide12.xml><?xml version="1.0" encoding="utf-8"?>
+<p:sld xmlns:a="http://schemas.openxmlformats.org/drawingml/2006/main" xmlns:r="http://schemas.openxmlformats.org/officeDocument/2006/relationships" xmlns:p="http://schemas.openxmlformats.org/presentationml/2006/main">
+  <p:cSld>
+    <p:spTree>
+      <p:nvGrpSpPr>
+        <p:cNvPr id="1" name=""/>
+        <p:cNvGrpSpPr/>
+        <p:nvPr/>
+      </p:nvGrpSpPr>
+      <p:grpSpPr>
+        <a:xfrm>
+          <a:off x="0" y="0"/>
+          <a:ext cx="0" cy="0"/>
+          <a:chOff x="0" y="0"/>
+          <a:chExt cx="0" cy="0"/>
+        </a:xfrm>
+      </p:grpSpPr>
+      <p:sp>
+        <p:nvSpPr>
+          <p:cNvPr id="2" name="Title 1">
+            <a:extLst>
+              <a:ext uri="{FF2B5EF4-FFF2-40B4-BE49-F238E27FC236}">
+                <a16:creationId xmlns:a16="http://schemas.microsoft.com/office/drawing/2014/main" id="{DDD69AA4-082B-9F49-AC1A-B3E0CE858FA2}"/>
+              </a:ext>
+            </a:extLst>
+          </p:cNvPr>
+          <p:cNvSpPr>
+            <a:spLocks noGrp="1"/>
+          </p:cNvSpPr>
+          <p:nvPr>
+            <p:ph type="title"/>
+          </p:nvPr>
+        </p:nvSpPr>
+        <p:spPr/>
+        <p:txBody>
+          <a:bodyPr/>
+          <a:lstStyle/>
+          <a:p>
+            <a:r>
+              <a:rPr lang="en-US" dirty="0"/>
+              <a:t>What 2 groups have in common</a:t>
+            </a:r>
+          </a:p>
+        </p:txBody>
+      </p:sp>
+      <p:sp>
+        <p:nvSpPr>
+          <p:cNvPr id="3" name="Content Placeholder 2">
+            <a:extLst>
+              <a:ext uri="{FF2B5EF4-FFF2-40B4-BE49-F238E27FC236}">
+                <a16:creationId xmlns:a16="http://schemas.microsoft.com/office/drawing/2014/main" id="{5482F4D6-E690-5B40-9FE9-F30A1826B05C}"/>
+              </a:ext>
+            </a:extLst>
+          </p:cNvPr>
+          <p:cNvSpPr>
+            <a:spLocks noGrp="1"/>
+          </p:cNvSpPr>
+          <p:nvPr>
+            <p:ph idx="1"/>
+          </p:nvPr>
+        </p:nvSpPr>
+        <p:spPr/>
+        <p:txBody>
+          <a:bodyPr/>
+          <a:lstStyle/>
+          <a:p>
+            <a:endParaRPr lang="en-US"/>
+          </a:p>
+        </p:txBody>
+      </p:sp>
+    </p:spTree>
+    <p:extLst>
+      <p:ext uri="{BB962C8B-B14F-4D97-AF65-F5344CB8AC3E}">
+        <p14:creationId xmlns:p14="http://schemas.microsoft.com/office/powerpoint/2010/main" val="1430135450"/>
+      </p:ext>
+    </p:extLst>
+  </p:cSld>
+  <p:clrMapOvr>
+    <a:masterClrMapping/>
+  </p:clrMapOvr>
+</p:sld>
+</file>
+
+<file path=ppt/slides/slide13.xml><?xml version="1.0" encoding="utf-8"?>
 <p:sld xmlns:a="http://schemas.openxmlformats.org/drawingml/2006/main" xmlns:r="http://schemas.openxmlformats.org/officeDocument/2006/relationships" xmlns:p="http://schemas.openxmlformats.org/presentationml/2006/main">
   <p:cSld>
     <p:bg>
@@ -5035,333 +5289,6 @@
           <a:chExt cx="0" cy="0"/>
         </a:xfrm>
       </p:grpSpPr>
-      <p:sp>
-        <p:nvSpPr>
-          <p:cNvPr id="332" name="Google Shape;332;p36"/>
-          <p:cNvSpPr txBox="1"/>
-          <p:nvPr/>
-        </p:nvSpPr>
-        <p:spPr>
-          <a:xfrm>
-            <a:off x="6894451" y="1149987"/>
-            <a:ext cx="4889483" cy="5623034"/>
-          </a:xfrm>
-          <a:prstGeom prst="rect">
-            <a:avLst/>
-          </a:prstGeom>
-          <a:noFill/>
-          <a:ln>
-            <a:noFill/>
-          </a:ln>
-        </p:spPr>
-        <p:txBody>
-          <a:bodyPr spcFirstLastPara="1" wrap="square" lIns="121900" tIns="121900" rIns="121900" bIns="121900" anchor="t" anchorCtr="0">
-            <a:noAutofit/>
-          </a:bodyPr>
-          <a:lstStyle/>
-          <a:p>
-            <a:r>
-              <a:rPr lang="en-US" sz="1333" b="1" dirty="0">
-                <a:solidFill>
-                  <a:srgbClr val="00297F"/>
-                </a:solidFill>
-                <a:latin typeface="Lato"/>
-                <a:ea typeface="Lato"/>
-                <a:cs typeface="Lato"/>
-                <a:sym typeface="Lato"/>
-              </a:rPr>
-              <a:t>What care about most in a conference</a:t>
-            </a:r>
-          </a:p>
-          <a:p>
-            <a:endParaRPr lang="en" sz="1333" dirty="0">
-              <a:solidFill>
-                <a:srgbClr val="00297F"/>
-              </a:solidFill>
-              <a:latin typeface="Lato"/>
-              <a:ea typeface="Lato"/>
-              <a:cs typeface="Lato"/>
-              <a:sym typeface="Lato"/>
-            </a:endParaRPr>
-          </a:p>
-          <a:p>
-            <a:endParaRPr lang="en" sz="1333" dirty="0">
-              <a:solidFill>
-                <a:srgbClr val="00297F"/>
-              </a:solidFill>
-              <a:latin typeface="Lato"/>
-              <a:ea typeface="Lato"/>
-              <a:cs typeface="Lato"/>
-              <a:sym typeface="Lato"/>
-            </a:endParaRPr>
-          </a:p>
-          <a:p>
-            <a:endParaRPr lang="en" sz="1333" dirty="0">
-              <a:solidFill>
-                <a:srgbClr val="00297F"/>
-              </a:solidFill>
-              <a:latin typeface="Lato"/>
-              <a:ea typeface="Lato"/>
-              <a:cs typeface="Lato"/>
-              <a:sym typeface="Lato"/>
-            </a:endParaRPr>
-          </a:p>
-          <a:p>
-            <a:endParaRPr lang="en" sz="1333" dirty="0">
-              <a:solidFill>
-                <a:srgbClr val="00297F"/>
-              </a:solidFill>
-              <a:latin typeface="Lato"/>
-              <a:ea typeface="Lato"/>
-              <a:cs typeface="Lato"/>
-              <a:sym typeface="Lato"/>
-            </a:endParaRPr>
-          </a:p>
-          <a:p>
-            <a:endParaRPr lang="en" sz="1333" dirty="0">
-              <a:solidFill>
-                <a:srgbClr val="00297F"/>
-              </a:solidFill>
-              <a:latin typeface="Lato"/>
-              <a:ea typeface="Lato"/>
-              <a:cs typeface="Lato"/>
-              <a:sym typeface="Lato"/>
-            </a:endParaRPr>
-          </a:p>
-          <a:p>
-            <a:endParaRPr lang="en" sz="1333" dirty="0">
-              <a:solidFill>
-                <a:srgbClr val="00297F"/>
-              </a:solidFill>
-              <a:latin typeface="Lato"/>
-              <a:ea typeface="Lato"/>
-              <a:cs typeface="Lato"/>
-              <a:sym typeface="Lato"/>
-            </a:endParaRPr>
-          </a:p>
-          <a:p>
-            <a:endParaRPr lang="en" sz="1333" dirty="0">
-              <a:solidFill>
-                <a:srgbClr val="00297F"/>
-              </a:solidFill>
-              <a:latin typeface="Lato"/>
-              <a:ea typeface="Lato"/>
-              <a:cs typeface="Lato"/>
-              <a:sym typeface="Lato"/>
-            </a:endParaRPr>
-          </a:p>
-          <a:p>
-            <a:endParaRPr lang="en" sz="1333" dirty="0">
-              <a:solidFill>
-                <a:srgbClr val="00297F"/>
-              </a:solidFill>
-              <a:latin typeface="Lato"/>
-              <a:ea typeface="Lato"/>
-              <a:cs typeface="Lato"/>
-              <a:sym typeface="Lato"/>
-            </a:endParaRPr>
-          </a:p>
-          <a:p>
-            <a:endParaRPr lang="en" sz="1333" dirty="0">
-              <a:solidFill>
-                <a:srgbClr val="00297F"/>
-              </a:solidFill>
-              <a:latin typeface="Lato"/>
-              <a:ea typeface="Lato"/>
-              <a:cs typeface="Lato"/>
-              <a:sym typeface="Lato"/>
-            </a:endParaRPr>
-          </a:p>
-          <a:p>
-            <a:endParaRPr lang="en" sz="1333" dirty="0">
-              <a:solidFill>
-                <a:srgbClr val="00297F"/>
-              </a:solidFill>
-              <a:latin typeface="Lato"/>
-              <a:ea typeface="Lato"/>
-              <a:cs typeface="Lato"/>
-              <a:sym typeface="Lato"/>
-            </a:endParaRPr>
-          </a:p>
-          <a:p>
-            <a:endParaRPr lang="en" sz="1333" dirty="0">
-              <a:solidFill>
-                <a:srgbClr val="00297F"/>
-              </a:solidFill>
-              <a:latin typeface="Lato"/>
-              <a:ea typeface="Lato"/>
-              <a:cs typeface="Lato"/>
-              <a:sym typeface="Lato"/>
-            </a:endParaRPr>
-          </a:p>
-          <a:p>
-            <a:r>
-              <a:rPr lang="en-US" sz="1333" b="1" dirty="0">
-                <a:solidFill>
-                  <a:srgbClr val="00297F"/>
-                </a:solidFill>
-                <a:latin typeface="Lato"/>
-                <a:ea typeface="Lato"/>
-                <a:cs typeface="Lato"/>
-                <a:sym typeface="Lato"/>
-              </a:rPr>
-              <a:t>Respondent’s advice for a research conference</a:t>
-            </a:r>
-          </a:p>
-          <a:p>
-            <a:pPr marL="609585"/>
-            <a:endParaRPr sz="1333" dirty="0">
-              <a:solidFill>
-                <a:srgbClr val="00297F"/>
-              </a:solidFill>
-              <a:latin typeface="Lato"/>
-              <a:ea typeface="Lato"/>
-              <a:cs typeface="Lato"/>
-              <a:sym typeface="Lato"/>
-            </a:endParaRPr>
-          </a:p>
-          <a:p>
-            <a:r>
-              <a:rPr lang="en-US" sz="1333" dirty="0">
-                <a:solidFill>
-                  <a:schemeClr val="tx1">
-                    <a:lumMod val="85000"/>
-                    <a:lumOff val="15000"/>
-                  </a:schemeClr>
-                </a:solidFill>
-                <a:latin typeface="Lato"/>
-              </a:rPr>
-              <a:t>"…Don't focus on practical workshops, they're usually too short to be useful. Focus on sharing experiences. (this type of sharing could be done online without and event....)”</a:t>
-            </a:r>
-          </a:p>
-          <a:p>
-            <a:endParaRPr lang="en-US" sz="1333" dirty="0">
-              <a:solidFill>
-                <a:schemeClr val="tx1">
-                  <a:lumMod val="85000"/>
-                  <a:lumOff val="15000"/>
-                </a:schemeClr>
-              </a:solidFill>
-              <a:latin typeface="Lato"/>
-              <a:sym typeface="Lato"/>
-            </a:endParaRPr>
-          </a:p>
-          <a:p>
-            <a:r>
-              <a:rPr lang="en-US" sz="1333" dirty="0">
-                <a:solidFill>
-                  <a:schemeClr val="tx1">
-                    <a:lumMod val="85000"/>
-                    <a:lumOff val="15000"/>
-                  </a:schemeClr>
-                </a:solidFill>
-                <a:latin typeface="Lato"/>
-              </a:rPr>
-              <a:t>“…</a:t>
-            </a:r>
-            <a:r>
-              <a:rPr lang="en-US" sz="1400" dirty="0"/>
-              <a:t>not just theory - I need to be able to take what I learn back to my job and use it.</a:t>
-            </a:r>
-            <a:r>
-              <a:rPr lang="en-US" sz="1333" dirty="0">
-                <a:solidFill>
-                  <a:schemeClr val="tx1">
-                    <a:lumMod val="85000"/>
-                    <a:lumOff val="15000"/>
-                  </a:schemeClr>
-                </a:solidFill>
-                <a:latin typeface="Lato"/>
-              </a:rPr>
-              <a:t>”</a:t>
-            </a:r>
-          </a:p>
-          <a:p>
-            <a:endParaRPr lang="en-US" sz="1333" dirty="0">
-              <a:solidFill>
-                <a:schemeClr val="tx1">
-                  <a:lumMod val="85000"/>
-                  <a:lumOff val="15000"/>
-                </a:schemeClr>
-              </a:solidFill>
-              <a:latin typeface="Lato"/>
-              <a:sym typeface="Lato"/>
-            </a:endParaRPr>
-          </a:p>
-          <a:p>
-            <a:r>
-              <a:rPr lang="en-US" sz="1333" dirty="0">
-                <a:solidFill>
-                  <a:schemeClr val="tx1">
-                    <a:lumMod val="85000"/>
-                    <a:lumOff val="15000"/>
-                  </a:schemeClr>
-                </a:solidFill>
-                <a:latin typeface="Lato"/>
-              </a:rPr>
-              <a:t>” …’techniques’ side is covered across a range of conferences. I feel like there are less conferences that really focus on the strategic (and possibly ops) side of research”</a:t>
-            </a:r>
-          </a:p>
-          <a:p>
-            <a:endParaRPr lang="en-US" sz="1333" dirty="0">
-              <a:solidFill>
-                <a:schemeClr val="tx1">
-                  <a:lumMod val="85000"/>
-                  <a:lumOff val="15000"/>
-                </a:schemeClr>
-              </a:solidFill>
-              <a:latin typeface="Lato"/>
-              <a:sym typeface="Lato"/>
-            </a:endParaRPr>
-          </a:p>
-          <a:p>
-            <a:r>
-              <a:rPr lang="en-US" sz="1333" dirty="0">
-                <a:solidFill>
-                  <a:schemeClr val="tx1">
-                    <a:lumMod val="85000"/>
-                    <a:lumOff val="15000"/>
-                  </a:schemeClr>
-                </a:solidFill>
-                <a:latin typeface="Lato"/>
-              </a:rPr>
-              <a:t>“…audience may be in different maturity levels of the research practice at least for some sessions so you may have different tracks based on that to cover a wider range of people.”</a:t>
-            </a:r>
-            <a:endParaRPr lang="en" sz="1333" dirty="0">
-              <a:solidFill>
-                <a:schemeClr val="tx1">
-                  <a:lumMod val="85000"/>
-                  <a:lumOff val="15000"/>
-                </a:schemeClr>
-              </a:solidFill>
-              <a:latin typeface="Lato"/>
-              <a:sym typeface="Lato"/>
-            </a:endParaRPr>
-          </a:p>
-          <a:p>
-            <a:endParaRPr lang="en" sz="1333" dirty="0">
-              <a:solidFill>
-                <a:srgbClr val="00297F"/>
-              </a:solidFill>
-              <a:latin typeface="Lato"/>
-              <a:ea typeface="Lato"/>
-              <a:cs typeface="Lato"/>
-              <a:sym typeface="Lato"/>
-            </a:endParaRPr>
-          </a:p>
-          <a:p>
-            <a:endParaRPr sz="1333" dirty="0">
-              <a:solidFill>
-                <a:srgbClr val="00297F"/>
-              </a:solidFill>
-              <a:latin typeface="Lato"/>
-              <a:ea typeface="Lato"/>
-              <a:cs typeface="Lato"/>
-              <a:sym typeface="Lato"/>
-            </a:endParaRPr>
-          </a:p>
-        </p:txBody>
-      </p:sp>
       <p:pic>
         <p:nvPicPr>
           <p:cNvPr id="9" name="Picture 8" descr="A screenshot of a cell phone&#10;&#10;Description automatically generated">
@@ -5392,6 +5319,310 @@
           </a:prstGeom>
         </p:spPr>
       </p:pic>
+      <p:sp>
+        <p:nvSpPr>
+          <p:cNvPr id="332" name="Google Shape;332;p36"/>
+          <p:cNvSpPr txBox="1"/>
+          <p:nvPr/>
+        </p:nvSpPr>
+        <p:spPr>
+          <a:xfrm>
+            <a:off x="6894451" y="1149987"/>
+            <a:ext cx="4889483" cy="5623034"/>
+          </a:xfrm>
+          <a:prstGeom prst="rect">
+            <a:avLst/>
+          </a:prstGeom>
+          <a:noFill/>
+          <a:ln>
+            <a:noFill/>
+          </a:ln>
+        </p:spPr>
+        <p:txBody>
+          <a:bodyPr spcFirstLastPara="1" wrap="square" lIns="121900" tIns="121900" rIns="121900" bIns="121900" anchor="t" anchorCtr="0">
+            <a:noAutofit/>
+          </a:bodyPr>
+          <a:lstStyle/>
+          <a:p>
+            <a:r>
+              <a:rPr lang="en-US" sz="1333" b="1" dirty="0">
+                <a:solidFill>
+                  <a:srgbClr val="00297F"/>
+                </a:solidFill>
+                <a:latin typeface="Lato"/>
+                <a:ea typeface="Lato"/>
+                <a:cs typeface="Lato"/>
+                <a:sym typeface="Lato"/>
+              </a:rPr>
+              <a:t>What they want to see</a:t>
+            </a:r>
+          </a:p>
+          <a:p>
+            <a:endParaRPr lang="en" sz="1333" dirty="0">
+              <a:solidFill>
+                <a:srgbClr val="00297F"/>
+              </a:solidFill>
+              <a:latin typeface="Lato"/>
+              <a:ea typeface="Lato"/>
+              <a:cs typeface="Lato"/>
+              <a:sym typeface="Lato"/>
+            </a:endParaRPr>
+          </a:p>
+          <a:p>
+            <a:endParaRPr lang="en" sz="1333" dirty="0">
+              <a:solidFill>
+                <a:srgbClr val="00297F"/>
+              </a:solidFill>
+              <a:latin typeface="Lato"/>
+              <a:ea typeface="Lato"/>
+              <a:cs typeface="Lato"/>
+              <a:sym typeface="Lato"/>
+            </a:endParaRPr>
+          </a:p>
+          <a:p>
+            <a:endParaRPr lang="en" sz="1333" dirty="0">
+              <a:solidFill>
+                <a:srgbClr val="00297F"/>
+              </a:solidFill>
+              <a:latin typeface="Lato"/>
+              <a:ea typeface="Lato"/>
+              <a:cs typeface="Lato"/>
+              <a:sym typeface="Lato"/>
+            </a:endParaRPr>
+          </a:p>
+          <a:p>
+            <a:endParaRPr lang="en" sz="1333" dirty="0">
+              <a:solidFill>
+                <a:srgbClr val="00297F"/>
+              </a:solidFill>
+              <a:latin typeface="Lato"/>
+              <a:ea typeface="Lato"/>
+              <a:cs typeface="Lato"/>
+              <a:sym typeface="Lato"/>
+            </a:endParaRPr>
+          </a:p>
+          <a:p>
+            <a:endParaRPr lang="en" sz="1333" dirty="0">
+              <a:solidFill>
+                <a:srgbClr val="00297F"/>
+              </a:solidFill>
+              <a:latin typeface="Lato"/>
+              <a:ea typeface="Lato"/>
+              <a:cs typeface="Lato"/>
+              <a:sym typeface="Lato"/>
+            </a:endParaRPr>
+          </a:p>
+          <a:p>
+            <a:endParaRPr lang="en" sz="1333" dirty="0">
+              <a:solidFill>
+                <a:srgbClr val="00297F"/>
+              </a:solidFill>
+              <a:latin typeface="Lato"/>
+              <a:ea typeface="Lato"/>
+              <a:cs typeface="Lato"/>
+              <a:sym typeface="Lato"/>
+            </a:endParaRPr>
+          </a:p>
+          <a:p>
+            <a:endParaRPr lang="en" sz="1333" dirty="0">
+              <a:solidFill>
+                <a:srgbClr val="00297F"/>
+              </a:solidFill>
+              <a:latin typeface="Lato"/>
+              <a:ea typeface="Lato"/>
+              <a:cs typeface="Lato"/>
+              <a:sym typeface="Lato"/>
+            </a:endParaRPr>
+          </a:p>
+          <a:p>
+            <a:endParaRPr lang="en" sz="1333" dirty="0">
+              <a:solidFill>
+                <a:srgbClr val="00297F"/>
+              </a:solidFill>
+              <a:latin typeface="Lato"/>
+              <a:ea typeface="Lato"/>
+              <a:cs typeface="Lato"/>
+              <a:sym typeface="Lato"/>
+            </a:endParaRPr>
+          </a:p>
+          <a:p>
+            <a:endParaRPr lang="en" sz="1333" dirty="0">
+              <a:solidFill>
+                <a:srgbClr val="00297F"/>
+              </a:solidFill>
+              <a:latin typeface="Lato"/>
+              <a:ea typeface="Lato"/>
+              <a:cs typeface="Lato"/>
+              <a:sym typeface="Lato"/>
+            </a:endParaRPr>
+          </a:p>
+          <a:p>
+            <a:endParaRPr lang="en" sz="1333" dirty="0">
+              <a:solidFill>
+                <a:srgbClr val="00297F"/>
+              </a:solidFill>
+              <a:latin typeface="Lato"/>
+              <a:ea typeface="Lato"/>
+              <a:cs typeface="Lato"/>
+              <a:sym typeface="Lato"/>
+            </a:endParaRPr>
+          </a:p>
+          <a:p>
+            <a:endParaRPr lang="en" sz="1333" dirty="0">
+              <a:solidFill>
+                <a:srgbClr val="00297F"/>
+              </a:solidFill>
+              <a:latin typeface="Lato"/>
+              <a:ea typeface="Lato"/>
+              <a:cs typeface="Lato"/>
+              <a:sym typeface="Lato"/>
+            </a:endParaRPr>
+          </a:p>
+          <a:p>
+            <a:r>
+              <a:rPr lang="en-US" sz="1333" b="1" dirty="0">
+                <a:solidFill>
+                  <a:srgbClr val="00297F"/>
+                </a:solidFill>
+                <a:latin typeface="Lato"/>
+                <a:ea typeface="Lato"/>
+                <a:cs typeface="Lato"/>
+                <a:sym typeface="Lato"/>
+              </a:rPr>
+              <a:t>Respondent’s advice for a research conference</a:t>
+            </a:r>
+          </a:p>
+          <a:p>
+            <a:pPr marL="609585"/>
+            <a:endParaRPr sz="1333" dirty="0">
+              <a:solidFill>
+                <a:srgbClr val="00297F"/>
+              </a:solidFill>
+              <a:latin typeface="Lato"/>
+              <a:ea typeface="Lato"/>
+              <a:cs typeface="Lato"/>
+              <a:sym typeface="Lato"/>
+            </a:endParaRPr>
+          </a:p>
+          <a:p>
+            <a:r>
+              <a:rPr lang="en-US" sz="1333" dirty="0">
+                <a:solidFill>
+                  <a:schemeClr val="tx1">
+                    <a:lumMod val="85000"/>
+                    <a:lumOff val="15000"/>
+                  </a:schemeClr>
+                </a:solidFill>
+                <a:latin typeface="Lato"/>
+              </a:rPr>
+              <a:t>"Don't focus on practical workshops, they're usually too short to be useful. Focus on sharing experiences. (could be done online without an event)”</a:t>
+            </a:r>
+          </a:p>
+          <a:p>
+            <a:endParaRPr lang="en-US" sz="1333" dirty="0">
+              <a:solidFill>
+                <a:schemeClr val="tx1">
+                  <a:lumMod val="85000"/>
+                  <a:lumOff val="15000"/>
+                </a:schemeClr>
+              </a:solidFill>
+              <a:latin typeface="Lato"/>
+              <a:sym typeface="Lato"/>
+            </a:endParaRPr>
+          </a:p>
+          <a:p>
+            <a:r>
+              <a:rPr lang="en-US" sz="1333" dirty="0">
+                <a:solidFill>
+                  <a:schemeClr val="tx1">
+                    <a:lumMod val="85000"/>
+                    <a:lumOff val="15000"/>
+                  </a:schemeClr>
+                </a:solidFill>
+                <a:latin typeface="Lato"/>
+              </a:rPr>
+              <a:t>“not just theory - I need to… take what I learn back to my job and use it.”</a:t>
+            </a:r>
+          </a:p>
+          <a:p>
+            <a:endParaRPr lang="en-US" sz="1333" dirty="0">
+              <a:solidFill>
+                <a:schemeClr val="tx1">
+                  <a:lumMod val="85000"/>
+                  <a:lumOff val="15000"/>
+                </a:schemeClr>
+              </a:solidFill>
+              <a:latin typeface="Lato"/>
+              <a:sym typeface="Lato"/>
+            </a:endParaRPr>
+          </a:p>
+          <a:p>
+            <a:r>
+              <a:rPr lang="en-US" sz="1400" dirty="0"/>
+              <a:t>“</a:t>
+            </a:r>
+            <a:r>
+              <a:rPr lang="en-US" sz="1333" dirty="0">
+                <a:solidFill>
+                  <a:schemeClr val="tx1">
+                    <a:lumMod val="85000"/>
+                    <a:lumOff val="15000"/>
+                  </a:schemeClr>
+                </a:solidFill>
+                <a:latin typeface="Lato"/>
+              </a:rPr>
+              <a:t>start by gaining credibility in the field. I don't know who you are, why you care and this survey doesn't seem to indicate you're an expert in the field”</a:t>
+            </a:r>
+          </a:p>
+          <a:p>
+            <a:endParaRPr lang="en-US" sz="1333" dirty="0">
+              <a:solidFill>
+                <a:schemeClr val="tx1">
+                  <a:lumMod val="85000"/>
+                  <a:lumOff val="15000"/>
+                </a:schemeClr>
+              </a:solidFill>
+              <a:latin typeface="Lato"/>
+              <a:sym typeface="Lato"/>
+            </a:endParaRPr>
+          </a:p>
+          <a:p>
+            <a:r>
+              <a:rPr lang="en-US" sz="1333" dirty="0">
+                <a:solidFill>
+                  <a:schemeClr val="tx1">
+                    <a:lumMod val="85000"/>
+                    <a:lumOff val="15000"/>
+                  </a:schemeClr>
+                </a:solidFill>
+                <a:latin typeface="Lato"/>
+              </a:rPr>
+              <a:t>“The next evolution of UXR has to be bigger than just "advocacy", and has to show our methods work”</a:t>
+            </a:r>
+            <a:endParaRPr lang="en" sz="1333" dirty="0">
+              <a:solidFill>
+                <a:schemeClr val="tx1">
+                  <a:lumMod val="85000"/>
+                  <a:lumOff val="15000"/>
+                </a:schemeClr>
+              </a:solidFill>
+              <a:latin typeface="Lato"/>
+              <a:sym typeface="Lato"/>
+            </a:endParaRPr>
+          </a:p>
+          <a:p>
+            <a:endParaRPr sz="1333" dirty="0">
+              <a:solidFill>
+                <a:srgbClr val="00297F"/>
+              </a:solidFill>
+              <a:latin typeface="Lato"/>
+              <a:ea typeface="Lato"/>
+              <a:cs typeface="Lato"/>
+              <a:sym typeface="Lato"/>
+            </a:endParaRPr>
+          </a:p>
+        </p:txBody>
+      </p:sp>
       <p:sp>
         <p:nvSpPr>
           <p:cNvPr id="330" name="Google Shape;330;p36"/>
@@ -6175,7 +6406,7 @@
 </p:sld>
 </file>
 
-<file path=ppt/slides/slide12.xml><?xml version="1.0" encoding="utf-8"?>
+<file path=ppt/slides/slide14.xml><?xml version="1.0" encoding="utf-8"?>
 <p:sld xmlns:a="http://schemas.openxmlformats.org/drawingml/2006/main" xmlns:r="http://schemas.openxmlformats.org/officeDocument/2006/relationships" xmlns:p="http://schemas.openxmlformats.org/presentationml/2006/main">
   <p:cSld>
     <p:bg>
@@ -7070,7 +7301,7 @@
                 <a:latin typeface="Lato"/>
                 <a:sym typeface="Merriweather"/>
               </a:rPr>
-              <a:t>“…</a:t>
+              <a:t>"</a:t>
             </a:r>
             <a:r>
               <a:rPr lang="en-US" sz="1333" dirty="0">
@@ -7082,7 +7313,7 @@
                 </a:solidFill>
                 <a:latin typeface="Lato"/>
               </a:rPr>
-              <a:t>workshops should target a specific level of expertise.</a:t>
+              <a:t>workshops should target a specific level of expertise</a:t>
             </a:r>
             <a:r>
               <a:rPr lang="en" sz="1333" dirty="0">
@@ -7123,7 +7354,7 @@
                 </a:solidFill>
                 <a:latin typeface="Lato"/>
               </a:rPr>
-              <a:t>“Examples of application in practice of established methods.”</a:t>
+              <a:t>“Examples of application in practice of established methods”</a:t>
             </a:r>
           </a:p>
           <a:p>
@@ -7151,7 +7382,7 @@
                 </a:solidFill>
                 <a:latin typeface="Lato"/>
               </a:rPr>
-              <a:t>“…creative ways to build activities into the day.”</a:t>
+              <a:t>“creative ways to build activities into the day.”</a:t>
             </a:r>
           </a:p>
           <a:p>
@@ -7179,7 +7410,7 @@
                 </a:solidFill>
                 <a:latin typeface="Lato"/>
               </a:rPr>
-              <a:t>“…more events for experienced practitioners.”</a:t>
+              <a:t>“more events for experienced practitioners”</a:t>
             </a:r>
           </a:p>
           <a:p>
@@ -7207,7 +7438,7 @@
                 </a:solidFill>
                 <a:latin typeface="Lato"/>
               </a:rPr>
-              <a:t>“…huge number of early-career folks who are struggling to get work in UX research roles, and we need to get them real-world experience.”</a:t>
+              <a:t>“huge number of early-career folks who are struggling to get work in UX research roles, and we need to get them real-world experience”</a:t>
             </a:r>
             <a:endParaRPr lang="en" sz="1400" dirty="0">
               <a:solidFill>
@@ -7244,7 +7475,7 @@
                 </a:solidFill>
                 <a:latin typeface="Lato"/>
               </a:rPr>
-              <a:t>“…Slack for pre-conference introductions, a channel for each speaker, … handle Q&amp;A through the Slack channels…”</a:t>
+              <a:t>“Slack for pre-conference introductions, a channel for each speaker, … handle Q&amp;A through the Slack channels”</a:t>
             </a:r>
             <a:endParaRPr lang="en" sz="1333" dirty="0">
               <a:solidFill>
@@ -7393,175 +7624,6 @@
 </p:sld>
 </file>
 
-<file path=ppt/slides/slide13.xml><?xml version="1.0" encoding="utf-8"?>
-<p:sld xmlns:a="http://schemas.openxmlformats.org/drawingml/2006/main" xmlns:r="http://schemas.openxmlformats.org/officeDocument/2006/relationships" xmlns:p="http://schemas.openxmlformats.org/presentationml/2006/main">
-  <p:cSld>
-    <p:spTree>
-      <p:nvGrpSpPr>
-        <p:cNvPr id="1" name=""/>
-        <p:cNvGrpSpPr/>
-        <p:nvPr/>
-      </p:nvGrpSpPr>
-      <p:grpSpPr>
-        <a:xfrm>
-          <a:off x="0" y="0"/>
-          <a:ext cx="0" cy="0"/>
-          <a:chOff x="0" y="0"/>
-          <a:chExt cx="0" cy="0"/>
-        </a:xfrm>
-      </p:grpSpPr>
-      <p:sp>
-        <p:nvSpPr>
-          <p:cNvPr id="2" name="Title 1">
-            <a:extLst>
-              <a:ext uri="{FF2B5EF4-FFF2-40B4-BE49-F238E27FC236}">
-                <a16:creationId xmlns:a16="http://schemas.microsoft.com/office/drawing/2014/main" id="{A5B6745E-598B-0B40-881D-80F5140CE428}"/>
-              </a:ext>
-            </a:extLst>
-          </p:cNvPr>
-          <p:cNvSpPr>
-            <a:spLocks noGrp="1"/>
-          </p:cNvSpPr>
-          <p:nvPr>
-            <p:ph type="title"/>
-          </p:nvPr>
-        </p:nvSpPr>
-        <p:spPr/>
-        <p:txBody>
-          <a:bodyPr/>
-          <a:lstStyle/>
-          <a:p>
-            <a:r>
-              <a:rPr lang="en-US" dirty="0"/>
-              <a:t>Findings about most likely</a:t>
-            </a:r>
-          </a:p>
-        </p:txBody>
-      </p:sp>
-      <p:sp>
-        <p:nvSpPr>
-          <p:cNvPr id="3" name="Content Placeholder 2">
-            <a:extLst>
-              <a:ext uri="{FF2B5EF4-FFF2-40B4-BE49-F238E27FC236}">
-                <a16:creationId xmlns:a16="http://schemas.microsoft.com/office/drawing/2014/main" id="{72818521-C879-E34C-8012-FB5DC9D0DF76}"/>
-              </a:ext>
-            </a:extLst>
-          </p:cNvPr>
-          <p:cNvSpPr>
-            <a:spLocks noGrp="1"/>
-          </p:cNvSpPr>
-          <p:nvPr>
-            <p:ph idx="1"/>
-          </p:nvPr>
-        </p:nvSpPr>
-        <p:spPr/>
-        <p:txBody>
-          <a:bodyPr/>
-          <a:lstStyle/>
-          <a:p>
-            <a:pPr marL="0" indent="0">
-              <a:buNone/>
-            </a:pPr>
-            <a:endParaRPr lang="en-US" dirty="0"/>
-          </a:p>
-        </p:txBody>
-      </p:sp>
-    </p:spTree>
-    <p:extLst>
-      <p:ext uri="{BB962C8B-B14F-4D97-AF65-F5344CB8AC3E}">
-        <p14:creationId xmlns:p14="http://schemas.microsoft.com/office/powerpoint/2010/main" val="1990694595"/>
-      </p:ext>
-    </p:extLst>
-  </p:cSld>
-  <p:clrMapOvr>
-    <a:masterClrMapping/>
-  </p:clrMapOvr>
-</p:sld>
-</file>
-
-<file path=ppt/slides/slide14.xml><?xml version="1.0" encoding="utf-8"?>
-<p:sld xmlns:a="http://schemas.openxmlformats.org/drawingml/2006/main" xmlns:r="http://schemas.openxmlformats.org/officeDocument/2006/relationships" xmlns:p="http://schemas.openxmlformats.org/presentationml/2006/main">
-  <p:cSld>
-    <p:spTree>
-      <p:nvGrpSpPr>
-        <p:cNvPr id="1" name=""/>
-        <p:cNvGrpSpPr/>
-        <p:nvPr/>
-      </p:nvGrpSpPr>
-      <p:grpSpPr>
-        <a:xfrm>
-          <a:off x="0" y="0"/>
-          <a:ext cx="0" cy="0"/>
-          <a:chOff x="0" y="0"/>
-          <a:chExt cx="0" cy="0"/>
-        </a:xfrm>
-      </p:grpSpPr>
-      <p:sp>
-        <p:nvSpPr>
-          <p:cNvPr id="3" name="Title 2">
-            <a:extLst>
-              <a:ext uri="{FF2B5EF4-FFF2-40B4-BE49-F238E27FC236}">
-                <a16:creationId xmlns:a16="http://schemas.microsoft.com/office/drawing/2014/main" id="{0FA260B2-9861-F341-9418-ECDF9EEC3E29}"/>
-              </a:ext>
-            </a:extLst>
-          </p:cNvPr>
-          <p:cNvSpPr>
-            <a:spLocks noGrp="1"/>
-          </p:cNvSpPr>
-          <p:nvPr>
-            <p:ph type="title"/>
-          </p:nvPr>
-        </p:nvSpPr>
-        <p:spPr/>
-        <p:txBody>
-          <a:bodyPr/>
-          <a:lstStyle/>
-          <a:p>
-            <a:r>
-              <a:rPr lang="en-US" dirty="0"/>
-              <a:t>Recommendations to RM</a:t>
-            </a:r>
-          </a:p>
-        </p:txBody>
-      </p:sp>
-      <p:sp>
-        <p:nvSpPr>
-          <p:cNvPr id="4" name="Content Placeholder 3">
-            <a:extLst>
-              <a:ext uri="{FF2B5EF4-FFF2-40B4-BE49-F238E27FC236}">
-                <a16:creationId xmlns:a16="http://schemas.microsoft.com/office/drawing/2014/main" id="{030D129C-3DE6-B34C-AA7E-68A7140A7C75}"/>
-              </a:ext>
-            </a:extLst>
-          </p:cNvPr>
-          <p:cNvSpPr>
-            <a:spLocks noGrp="1"/>
-          </p:cNvSpPr>
-          <p:nvPr>
-            <p:ph idx="1"/>
-          </p:nvPr>
-        </p:nvSpPr>
-        <p:spPr/>
-        <p:txBody>
-          <a:bodyPr/>
-          <a:lstStyle/>
-          <a:p>
-            <a:endParaRPr lang="en-US"/>
-          </a:p>
-        </p:txBody>
-      </p:sp>
-    </p:spTree>
-    <p:extLst>
-      <p:ext uri="{BB962C8B-B14F-4D97-AF65-F5344CB8AC3E}">
-        <p14:creationId xmlns:p14="http://schemas.microsoft.com/office/powerpoint/2010/main" val="688132072"/>
-      </p:ext>
-    </p:extLst>
-  </p:cSld>
-  <p:clrMapOvr>
-    <a:masterClrMapping/>
-  </p:clrMapOvr>
-</p:sld>
-</file>
-
 <file path=ppt/slides/slide15.xml><?xml version="1.0" encoding="utf-8"?>
 <p:sld xmlns:a="http://schemas.openxmlformats.org/drawingml/2006/main" xmlns:r="http://schemas.openxmlformats.org/officeDocument/2006/relationships" xmlns:p="http://schemas.openxmlformats.org/presentationml/2006/main">
   <p:cSld>
@@ -7638,7 +7700,7 @@
     </p:spTree>
     <p:extLst>
       <p:ext uri="{BB962C8B-B14F-4D97-AF65-F5344CB8AC3E}">
-        <p14:creationId xmlns:p14="http://schemas.microsoft.com/office/powerpoint/2010/main" val="2408610909"/>
+        <p14:creationId xmlns:p14="http://schemas.microsoft.com/office/powerpoint/2010/main" val="1990694595"/>
       </p:ext>
     </p:extLst>
   </p:cSld>
@@ -7649,6 +7711,89 @@
 </file>
 
 <file path=ppt/slides/slide16.xml><?xml version="1.0" encoding="utf-8"?>
+<p:sld xmlns:a="http://schemas.openxmlformats.org/drawingml/2006/main" xmlns:r="http://schemas.openxmlformats.org/officeDocument/2006/relationships" xmlns:p="http://schemas.openxmlformats.org/presentationml/2006/main">
+  <p:cSld>
+    <p:spTree>
+      <p:nvGrpSpPr>
+        <p:cNvPr id="1" name=""/>
+        <p:cNvGrpSpPr/>
+        <p:nvPr/>
+      </p:nvGrpSpPr>
+      <p:grpSpPr>
+        <a:xfrm>
+          <a:off x="0" y="0"/>
+          <a:ext cx="0" cy="0"/>
+          <a:chOff x="0" y="0"/>
+          <a:chExt cx="0" cy="0"/>
+        </a:xfrm>
+      </p:grpSpPr>
+      <p:sp>
+        <p:nvSpPr>
+          <p:cNvPr id="3" name="Title 2">
+            <a:extLst>
+              <a:ext uri="{FF2B5EF4-FFF2-40B4-BE49-F238E27FC236}">
+                <a16:creationId xmlns:a16="http://schemas.microsoft.com/office/drawing/2014/main" id="{0FA260B2-9861-F341-9418-ECDF9EEC3E29}"/>
+              </a:ext>
+            </a:extLst>
+          </p:cNvPr>
+          <p:cNvSpPr>
+            <a:spLocks noGrp="1"/>
+          </p:cNvSpPr>
+          <p:nvPr>
+            <p:ph type="title"/>
+          </p:nvPr>
+        </p:nvSpPr>
+        <p:spPr/>
+        <p:txBody>
+          <a:bodyPr/>
+          <a:lstStyle/>
+          <a:p>
+            <a:r>
+              <a:rPr lang="en-US" dirty="0"/>
+              <a:t>Recommendations to RM</a:t>
+            </a:r>
+          </a:p>
+        </p:txBody>
+      </p:sp>
+      <p:sp>
+        <p:nvSpPr>
+          <p:cNvPr id="4" name="Content Placeholder 3">
+            <a:extLst>
+              <a:ext uri="{FF2B5EF4-FFF2-40B4-BE49-F238E27FC236}">
+                <a16:creationId xmlns:a16="http://schemas.microsoft.com/office/drawing/2014/main" id="{030D129C-3DE6-B34C-AA7E-68A7140A7C75}"/>
+              </a:ext>
+            </a:extLst>
+          </p:cNvPr>
+          <p:cNvSpPr>
+            <a:spLocks noGrp="1"/>
+          </p:cNvSpPr>
+          <p:nvPr>
+            <p:ph idx="1"/>
+          </p:nvPr>
+        </p:nvSpPr>
+        <p:spPr/>
+        <p:txBody>
+          <a:bodyPr/>
+          <a:lstStyle/>
+          <a:p>
+            <a:endParaRPr lang="en-US"/>
+          </a:p>
+        </p:txBody>
+      </p:sp>
+    </p:spTree>
+    <p:extLst>
+      <p:ext uri="{BB962C8B-B14F-4D97-AF65-F5344CB8AC3E}">
+        <p14:creationId xmlns:p14="http://schemas.microsoft.com/office/powerpoint/2010/main" val="688132072"/>
+      </p:ext>
+    </p:extLst>
+  </p:cSld>
+  <p:clrMapOvr>
+    <a:masterClrMapping/>
+  </p:clrMapOvr>
+</p:sld>
+</file>
+
+<file path=ppt/slides/slide17.xml><?xml version="1.0" encoding="utf-8"?>
 <p:sld xmlns:a="http://schemas.openxmlformats.org/drawingml/2006/main" xmlns:r="http://schemas.openxmlformats.org/officeDocument/2006/relationships" xmlns:p="http://schemas.openxmlformats.org/presentationml/2006/main">
   <p:cSld>
     <p:spTree>
@@ -7801,7 +7946,16 @@
           <a:p>
             <a:r>
               <a:rPr lang="en-US" dirty="0"/>
-              <a:t>Apply data science methods to quantitative and qualitative survey data for Rosenfeld Media, a New York conference-producing and publishing company.</a:t>
+              <a:t>Apply data science methods to quantitative and free-text survey data for Rosenfeld Media, a conference-producing and publishing company.</a:t>
+            </a:r>
+          </a:p>
+          <a:p>
+            <a:endParaRPr lang="en-US" dirty="0"/>
+          </a:p>
+          <a:p>
+            <a:r>
+              <a:rPr lang="en-US" dirty="0"/>
+              <a:t>The survey will assist in the creation and marketing of a new conference on research.</a:t>
             </a:r>
           </a:p>
           <a:p>
@@ -7813,8 +7967,86 @@
           <a:p>
             <a:r>
               <a:rPr lang="en-US" dirty="0"/>
-              <a:t>RM wants to automate the process of extracting actionable information from surveys to create survey-respondent profiles and assist with marketing. </a:t>
-            </a:r>
+              <a:t>RM wants to automate the process of extracting information from surveys to create survey-respondent profiles. </a:t>
+            </a:r>
+          </a:p>
+        </p:txBody>
+      </p:sp>
+      <p:sp>
+        <p:nvSpPr>
+          <p:cNvPr id="4" name="Rectangle 3">
+            <a:extLst>
+              <a:ext uri="{FF2B5EF4-FFF2-40B4-BE49-F238E27FC236}">
+                <a16:creationId xmlns:a16="http://schemas.microsoft.com/office/drawing/2014/main" id="{53BCE1E7-20DA-C944-827E-852B07D19CAB}"/>
+              </a:ext>
+            </a:extLst>
+          </p:cNvPr>
+          <p:cNvSpPr/>
+          <p:nvPr/>
+        </p:nvSpPr>
+        <p:spPr>
+          <a:xfrm>
+            <a:off x="5977217" y="3244334"/>
+            <a:ext cx="237566" cy="369332"/>
+          </a:xfrm>
+          <a:prstGeom prst="rect">
+            <a:avLst/>
+          </a:prstGeom>
+        </p:spPr>
+        <p:txBody>
+          <a:bodyPr wrap="none">
+            <a:spAutoFit/>
+          </a:bodyPr>
+          <a:lstStyle/>
+          <a:p>
+            <a:r>
+              <a:rPr lang="en-US" dirty="0">
+                <a:solidFill>
+                  <a:srgbClr val="000000"/>
+                </a:solidFill>
+              </a:rPr>
+              <a:t> </a:t>
+            </a:r>
+            <a:endParaRPr lang="en-US" dirty="0"/>
+          </a:p>
+        </p:txBody>
+      </p:sp>
+      <p:sp>
+        <p:nvSpPr>
+          <p:cNvPr id="5" name="Rectangle 4">
+            <a:extLst>
+              <a:ext uri="{FF2B5EF4-FFF2-40B4-BE49-F238E27FC236}">
+                <a16:creationId xmlns:a16="http://schemas.microsoft.com/office/drawing/2014/main" id="{05D9490C-EC89-0945-894C-13CD2D7E970B}"/>
+              </a:ext>
+            </a:extLst>
+          </p:cNvPr>
+          <p:cNvSpPr/>
+          <p:nvPr/>
+        </p:nvSpPr>
+        <p:spPr>
+          <a:xfrm>
+            <a:off x="5977217" y="3244334"/>
+            <a:ext cx="237566" cy="369332"/>
+          </a:xfrm>
+          <a:prstGeom prst="rect">
+            <a:avLst/>
+          </a:prstGeom>
+        </p:spPr>
+        <p:txBody>
+          <a:bodyPr wrap="none">
+            <a:spAutoFit/>
+          </a:bodyPr>
+          <a:lstStyle/>
+          <a:p>
+            <a:r>
+              <a:rPr lang="en-US" dirty="0">
+                <a:solidFill>
+                  <a:srgbClr val="000000"/>
+                </a:solidFill>
+              </a:rPr>
+              <a:t> </a:t>
+            </a:r>
+            <a:endParaRPr lang="en-US" dirty="0"/>
           </a:p>
         </p:txBody>
       </p:sp>
@@ -7897,23 +8129,17 @@
           <a:bodyPr/>
           <a:lstStyle/>
           <a:p>
+            <a:pPr fontAlgn="base"/>
             <a:r>
               <a:rPr lang="en-US" dirty="0"/>
-              <a:t>2 parts</a:t>
-            </a:r>
-          </a:p>
-          <a:p>
-            <a:pPr lvl="1"/>
+              <a:t>Recreate existing personas using DS tools</a:t>
+            </a:r>
+          </a:p>
+          <a:p>
+            <a:pPr fontAlgn="base"/>
             <a:r>
               <a:rPr lang="en-US" dirty="0"/>
-              <a:t>Recreate personas using statistical natural language processing techniques</a:t>
-            </a:r>
-          </a:p>
-          <a:p>
-            <a:pPr lvl="1"/>
-            <a:r>
-              <a:rPr lang="en-US" dirty="0"/>
-              <a:t> </a:t>
+              <a:t>Use DS tools to create new personas</a:t>
             </a:r>
           </a:p>
         </p:txBody>
@@ -7953,7 +8179,7 @@
           <p:cNvPr id="2" name="Title 1">
             <a:extLst>
               <a:ext uri="{FF2B5EF4-FFF2-40B4-BE49-F238E27FC236}">
-                <a16:creationId xmlns:a16="http://schemas.microsoft.com/office/drawing/2014/main" id="{471C47D3-1F48-4F48-BC51-13F81D100FCC}"/>
+                <a16:creationId xmlns:a16="http://schemas.microsoft.com/office/drawing/2014/main" id="{B61253C5-652F-9846-A08E-0254913E9567}"/>
               </a:ext>
             </a:extLst>
           </p:cNvPr>
@@ -7971,7 +8197,7 @@
           <a:p>
             <a:r>
               <a:rPr lang="en-US" dirty="0"/>
-              <a:t>Original personas</a:t>
+              <a:t>Goals: to help RM to</a:t>
             </a:r>
           </a:p>
         </p:txBody>
@@ -7981,7 +8207,7 @@
           <p:cNvPr id="3" name="Content Placeholder 2">
             <a:extLst>
               <a:ext uri="{FF2B5EF4-FFF2-40B4-BE49-F238E27FC236}">
-                <a16:creationId xmlns:a16="http://schemas.microsoft.com/office/drawing/2014/main" id="{302BE219-CBFA-DF49-8DE0-E36724702E31}"/>
+                <a16:creationId xmlns:a16="http://schemas.microsoft.com/office/drawing/2014/main" id="{43D6D774-DF6B-9741-B1DC-8BC669EB7A46}"/>
               </a:ext>
             </a:extLst>
           </p:cNvPr>
@@ -7997,14 +8223,53 @@
           <a:bodyPr/>
           <a:lstStyle/>
           <a:p>
-            <a:endParaRPr lang="en-US"/>
+            <a:r>
+              <a:rPr lang="en-US" dirty="0"/>
+              <a:t>Determine who to market the conference to</a:t>
+            </a:r>
+          </a:p>
+          <a:p>
+            <a:r>
+              <a:rPr lang="en-US" dirty="0"/>
+              <a:t>Determine the best format/content for the conference</a:t>
+            </a:r>
+          </a:p>
+          <a:p>
+            <a:r>
+              <a:rPr lang="en-US" dirty="0"/>
+              <a:t>Determine the survey questions which are most/least valuable</a:t>
+            </a:r>
+          </a:p>
+          <a:p>
+            <a:r>
+              <a:rPr lang="en-US" dirty="0"/>
+              <a:t>Provide key findings about survey respondents</a:t>
+            </a:r>
+          </a:p>
+          <a:p>
+            <a:r>
+              <a:rPr lang="en-US" dirty="0"/>
+              <a:t>Provide Python code that can be reused for similar analyses</a:t>
+            </a:r>
+          </a:p>
+          <a:p>
+            <a:pPr marL="0" indent="0">
+              <a:buNone/>
+            </a:pPr>
+            <a:br>
+              <a:rPr lang="en-US" dirty="0"/>
+            </a:br>
+            <a:br>
+              <a:rPr lang="en-US" dirty="0"/>
+            </a:br>
+            <a:endParaRPr lang="en-US" dirty="0"/>
           </a:p>
         </p:txBody>
       </p:sp>
     </p:spTree>
     <p:extLst>
       <p:ext uri="{BB962C8B-B14F-4D97-AF65-F5344CB8AC3E}">
-        <p14:creationId xmlns:p14="http://schemas.microsoft.com/office/powerpoint/2010/main" val="3371586424"/>
+        <p14:creationId xmlns:p14="http://schemas.microsoft.com/office/powerpoint/2010/main" val="4123384484"/>
       </p:ext>
     </p:extLst>
   </p:cSld>
@@ -8036,7 +8301,7 @@
           <p:cNvPr id="2" name="Title 1">
             <a:extLst>
               <a:ext uri="{FF2B5EF4-FFF2-40B4-BE49-F238E27FC236}">
-                <a16:creationId xmlns:a16="http://schemas.microsoft.com/office/drawing/2014/main" id="{62F1C53D-058B-C94E-944C-EE5B8308F673}"/>
+                <a16:creationId xmlns:a16="http://schemas.microsoft.com/office/drawing/2014/main" id="{CB32DED7-FA4A-9040-9039-4DBF3EBB7D1B}"/>
               </a:ext>
             </a:extLst>
           </p:cNvPr>
@@ -8054,7 +8319,7 @@
           <a:p>
             <a:r>
               <a:rPr lang="en-US" dirty="0"/>
-              <a:t>Re-created personas</a:t>
+              <a:t>Deliverables</a:t>
             </a:r>
           </a:p>
         </p:txBody>
@@ -8064,7 +8329,7 @@
           <p:cNvPr id="3" name="Content Placeholder 2">
             <a:extLst>
               <a:ext uri="{FF2B5EF4-FFF2-40B4-BE49-F238E27FC236}">
-                <a16:creationId xmlns:a16="http://schemas.microsoft.com/office/drawing/2014/main" id="{56F77981-9F5C-F84C-8D6B-6F368E95DFCE}"/>
+                <a16:creationId xmlns:a16="http://schemas.microsoft.com/office/drawing/2014/main" id="{483E4555-2587-FD44-BDD9-BC85B9CDF77F}"/>
               </a:ext>
             </a:extLst>
           </p:cNvPr>
@@ -8080,14 +8345,36 @@
           <a:bodyPr/>
           <a:lstStyle/>
           <a:p>
-            <a:endParaRPr lang="en-US"/>
+            <a:r>
+              <a:rPr lang="en-US" dirty="0"/>
+              <a:t>New personas</a:t>
+            </a:r>
+          </a:p>
+          <a:p>
+            <a:r>
+              <a:rPr lang="en-US" dirty="0"/>
+              <a:t>Python code to replicate analysis</a:t>
+            </a:r>
+          </a:p>
+          <a:p>
+            <a:r>
+              <a:rPr lang="en-US" dirty="0"/>
+              <a:t>Recommendations for changes to the survey tool</a:t>
+            </a:r>
+            <a:br>
+              <a:rPr lang="en-US" dirty="0"/>
+            </a:br>
+            <a:br>
+              <a:rPr lang="en-US" dirty="0"/>
+            </a:br>
+            <a:endParaRPr lang="en-US" dirty="0"/>
           </a:p>
         </p:txBody>
       </p:sp>
     </p:spTree>
     <p:extLst>
       <p:ext uri="{BB962C8B-B14F-4D97-AF65-F5344CB8AC3E}">
-        <p14:creationId xmlns:p14="http://schemas.microsoft.com/office/powerpoint/2010/main" val="2417738851"/>
+        <p14:creationId xmlns:p14="http://schemas.microsoft.com/office/powerpoint/2010/main" val="2703173126"/>
       </p:ext>
     </p:extLst>
   </p:cSld>
@@ -8119,7 +8406,7 @@
           <p:cNvPr id="2" name="Title 1">
             <a:extLst>
               <a:ext uri="{FF2B5EF4-FFF2-40B4-BE49-F238E27FC236}">
-                <a16:creationId xmlns:a16="http://schemas.microsoft.com/office/drawing/2014/main" id="{13D54531-4A0F-4446-9812-65A64214B1D5}"/>
+                <a16:creationId xmlns:a16="http://schemas.microsoft.com/office/drawing/2014/main" id="{7A599E3C-877A-AD46-B25F-3A4E5A3C1F33}"/>
               </a:ext>
             </a:extLst>
           </p:cNvPr>
@@ -8137,7 +8424,7 @@
           <a:p>
             <a:r>
               <a:rPr lang="en-US" dirty="0"/>
-              <a:t>Differences</a:t>
+              <a:t>Phase 1 goals</a:t>
             </a:r>
           </a:p>
         </p:txBody>
@@ -8147,7 +8434,7 @@
           <p:cNvPr id="3" name="Content Placeholder 2">
             <a:extLst>
               <a:ext uri="{FF2B5EF4-FFF2-40B4-BE49-F238E27FC236}">
-                <a16:creationId xmlns:a16="http://schemas.microsoft.com/office/drawing/2014/main" id="{3D0C6087-4DA9-A74C-BE14-67B03B7D3256}"/>
+                <a16:creationId xmlns:a16="http://schemas.microsoft.com/office/drawing/2014/main" id="{6D585DF1-4199-2F40-B30F-7C61A594F6DD}"/>
               </a:ext>
             </a:extLst>
           </p:cNvPr>
@@ -8163,14 +8450,35 @@
           <a:bodyPr/>
           <a:lstStyle/>
           <a:p>
-            <a:endParaRPr lang="en-US"/>
+            <a:pPr fontAlgn="base"/>
+            <a:r>
+              <a:rPr lang="en-US" dirty="0"/>
+              <a:t>Proof of concept: using data science techniques to generate profiles similar to those generated </a:t>
+            </a:r>
+          </a:p>
+          <a:p>
+            <a:pPr fontAlgn="base"/>
+            <a:r>
+              <a:rPr lang="en-US" dirty="0"/>
+              <a:t>Use data science techniques to recreate the the division of survey respondents into 5 personas</a:t>
+            </a:r>
+          </a:p>
+          <a:p>
+            <a:pPr fontAlgn="base"/>
+            <a:r>
+              <a:rPr lang="en-US" dirty="0"/>
+              <a:t>Answer the same questions in the existing personas but with our analysis of the data - compare significant differences.</a:t>
+            </a:r>
+          </a:p>
+          <a:p>
+            <a:endParaRPr lang="en-US" dirty="0"/>
           </a:p>
         </p:txBody>
       </p:sp>
     </p:spTree>
     <p:extLst>
       <p:ext uri="{BB962C8B-B14F-4D97-AF65-F5344CB8AC3E}">
-        <p14:creationId xmlns:p14="http://schemas.microsoft.com/office/powerpoint/2010/main" val="2726472941"/>
+        <p14:creationId xmlns:p14="http://schemas.microsoft.com/office/powerpoint/2010/main" val="77068880"/>
       </p:ext>
     </p:extLst>
   </p:cSld>
@@ -8202,7 +8510,7 @@
           <p:cNvPr id="2" name="Title 1">
             <a:extLst>
               <a:ext uri="{FF2B5EF4-FFF2-40B4-BE49-F238E27FC236}">
-                <a16:creationId xmlns:a16="http://schemas.microsoft.com/office/drawing/2014/main" id="{9F5FC8CB-5A36-4642-8C78-EB7F14F7AA44}"/>
+                <a16:creationId xmlns:a16="http://schemas.microsoft.com/office/drawing/2014/main" id="{471C47D3-1F48-4F48-BC51-13F81D100FCC}"/>
               </a:ext>
             </a:extLst>
           </p:cNvPr>
@@ -8220,7 +8528,7 @@
           <a:p>
             <a:r>
               <a:rPr lang="en-US" dirty="0"/>
-              <a:t>Re-imagined personas</a:t>
+              <a:t>Original personas</a:t>
             </a:r>
           </a:p>
         </p:txBody>
@@ -8230,7 +8538,7 @@
           <p:cNvPr id="3" name="Content Placeholder 2">
             <a:extLst>
               <a:ext uri="{FF2B5EF4-FFF2-40B4-BE49-F238E27FC236}">
-                <a16:creationId xmlns:a16="http://schemas.microsoft.com/office/drawing/2014/main" id="{C11D2363-7B1F-7D4E-B832-1A324908E15F}"/>
+                <a16:creationId xmlns:a16="http://schemas.microsoft.com/office/drawing/2014/main" id="{302BE219-CBFA-DF49-8DE0-E36724702E31}"/>
               </a:ext>
             </a:extLst>
           </p:cNvPr>
@@ -8246,9 +8554,68 @@
           <a:bodyPr/>
           <a:lstStyle/>
           <a:p>
+            <a:pPr marL="457200" lvl="0" indent="-336550">
+              <a:spcBef>
+                <a:spcPts val="0"/>
+              </a:spcBef>
+              <a:buSzPts val="1700"/>
+              <a:buAutoNum type="arabicPeriod"/>
+            </a:pPr>
             <a:r>
               <a:rPr lang="en-US" dirty="0"/>
-              <a:t>Methods</a:t>
+              <a:t>Very Experienced Researchers </a:t>
+            </a:r>
+          </a:p>
+          <a:p>
+            <a:pPr marL="457200" lvl="0" indent="-336550">
+              <a:spcBef>
+                <a:spcPts val="0"/>
+              </a:spcBef>
+              <a:buSzPts val="1700"/>
+              <a:buAutoNum type="arabicPeriod"/>
+            </a:pPr>
+            <a:r>
+              <a:rPr lang="en-US" dirty="0"/>
+              <a:t>Somewhat Experienced Researchers </a:t>
+            </a:r>
+          </a:p>
+          <a:p>
+            <a:pPr marL="457200" lvl="0" indent="-336550">
+              <a:spcBef>
+                <a:spcPts val="0"/>
+              </a:spcBef>
+              <a:buSzPts val="1700"/>
+              <a:buAutoNum type="arabicPeriod"/>
+            </a:pPr>
+            <a:r>
+              <a:rPr lang="en-US" dirty="0"/>
+              <a:t>Less Experienced Researchers </a:t>
+            </a:r>
+          </a:p>
+          <a:p>
+            <a:pPr marL="457200" lvl="0" indent="-336550">
+              <a:spcBef>
+                <a:spcPts val="0"/>
+              </a:spcBef>
+              <a:buSzPts val="1700"/>
+              <a:buAutoNum type="arabicPeriod"/>
+            </a:pPr>
+            <a:r>
+              <a:rPr lang="en-US" dirty="0"/>
+              <a:t>Executive or Consultant </a:t>
+            </a:r>
+          </a:p>
+          <a:p>
+            <a:pPr marL="457200" lvl="0" indent="-336550">
+              <a:spcBef>
+                <a:spcPts val="0"/>
+              </a:spcBef>
+              <a:buSzPts val="1700"/>
+              <a:buAutoNum type="arabicPeriod"/>
+            </a:pPr>
+            <a:r>
+              <a:rPr lang="en-US" dirty="0"/>
+              <a:t>Specialist </a:t>
             </a:r>
           </a:p>
         </p:txBody>
@@ -8256,7 +8623,7 @@
     </p:spTree>
     <p:extLst>
       <p:ext uri="{BB962C8B-B14F-4D97-AF65-F5344CB8AC3E}">
-        <p14:creationId xmlns:p14="http://schemas.microsoft.com/office/powerpoint/2010/main" val="3322844244"/>
+        <p14:creationId xmlns:p14="http://schemas.microsoft.com/office/powerpoint/2010/main" val="3371586424"/>
       </p:ext>
     </p:extLst>
   </p:cSld>
@@ -8288,7 +8655,7 @@
           <p:cNvPr id="2" name="Title 1">
             <a:extLst>
               <a:ext uri="{FF2B5EF4-FFF2-40B4-BE49-F238E27FC236}">
-                <a16:creationId xmlns:a16="http://schemas.microsoft.com/office/drawing/2014/main" id="{2CD1A3D2-D31F-AF47-8E90-F2728D638279}"/>
+                <a16:creationId xmlns:a16="http://schemas.microsoft.com/office/drawing/2014/main" id="{62F1C53D-058B-C94E-944C-EE5B8308F673}"/>
               </a:ext>
             </a:extLst>
           </p:cNvPr>
@@ -8306,7 +8673,7 @@
           <a:p>
             <a:r>
               <a:rPr lang="en-US" dirty="0"/>
-              <a:t>Lowest entropy questions</a:t>
+              <a:t>Re-imagined personas</a:t>
             </a:r>
           </a:p>
         </p:txBody>
@@ -8316,7 +8683,7 @@
           <p:cNvPr id="3" name="Content Placeholder 2">
             <a:extLst>
               <a:ext uri="{FF2B5EF4-FFF2-40B4-BE49-F238E27FC236}">
-                <a16:creationId xmlns:a16="http://schemas.microsoft.com/office/drawing/2014/main" id="{C6D4322D-0A4F-4249-8AE9-29528E3D49A9}"/>
+                <a16:creationId xmlns:a16="http://schemas.microsoft.com/office/drawing/2014/main" id="{56F77981-9F5C-F84C-8D6B-6F368E95DFCE}"/>
               </a:ext>
             </a:extLst>
           </p:cNvPr>
@@ -8332,14 +8699,23 @@
           <a:bodyPr/>
           <a:lstStyle/>
           <a:p>
-            <a:endParaRPr lang="en-US" dirty="0"/>
+            <a:r>
+              <a:rPr lang="en-US" dirty="0"/>
+              <a:t>Not/somewhat Likely to Attend</a:t>
+            </a:r>
+          </a:p>
+          <a:p>
+            <a:r>
+              <a:rPr lang="en-US" dirty="0"/>
+              <a:t>Most Likely to Attend</a:t>
+            </a:r>
           </a:p>
         </p:txBody>
       </p:sp>
     </p:spTree>
     <p:extLst>
       <p:ext uri="{BB962C8B-B14F-4D97-AF65-F5344CB8AC3E}">
-        <p14:creationId xmlns:p14="http://schemas.microsoft.com/office/powerpoint/2010/main" val="3575397538"/>
+        <p14:creationId xmlns:p14="http://schemas.microsoft.com/office/powerpoint/2010/main" val="2417738851"/>
       </p:ext>
     </p:extLst>
   </p:cSld>
@@ -8371,7 +8747,7 @@
           <p:cNvPr id="2" name="Title 1">
             <a:extLst>
               <a:ext uri="{FF2B5EF4-FFF2-40B4-BE49-F238E27FC236}">
-                <a16:creationId xmlns:a16="http://schemas.microsoft.com/office/drawing/2014/main" id="{DDD69AA4-082B-9F49-AC1A-B3E0CE858FA2}"/>
+                <a16:creationId xmlns:a16="http://schemas.microsoft.com/office/drawing/2014/main" id="{13D54531-4A0F-4446-9812-65A64214B1D5}"/>
               </a:ext>
             </a:extLst>
           </p:cNvPr>
@@ -8389,7 +8765,7 @@
           <a:p>
             <a:r>
               <a:rPr lang="en-US" dirty="0"/>
-              <a:t>What 2 groups have in common</a:t>
+              <a:t>Differences</a:t>
             </a:r>
           </a:p>
         </p:txBody>
@@ -8399,7 +8775,7 @@
           <p:cNvPr id="3" name="Content Placeholder 2">
             <a:extLst>
               <a:ext uri="{FF2B5EF4-FFF2-40B4-BE49-F238E27FC236}">
-                <a16:creationId xmlns:a16="http://schemas.microsoft.com/office/drawing/2014/main" id="{5482F4D6-E690-5B40-9FE9-F30A1826B05C}"/>
+                <a16:creationId xmlns:a16="http://schemas.microsoft.com/office/drawing/2014/main" id="{3D0C6087-4DA9-A74C-BE14-67B03B7D3256}"/>
               </a:ext>
             </a:extLst>
           </p:cNvPr>
@@ -8422,7 +8798,7 @@
     </p:spTree>
     <p:extLst>
       <p:ext uri="{BB962C8B-B14F-4D97-AF65-F5344CB8AC3E}">
-        <p14:creationId xmlns:p14="http://schemas.microsoft.com/office/powerpoint/2010/main" val="1430135450"/>
+        <p14:creationId xmlns:p14="http://schemas.microsoft.com/office/powerpoint/2010/main" val="2726472941"/>
       </p:ext>
     </p:extLst>
   </p:cSld>

</xml_diff>

<commit_message>
Next version of presentation
</commit_message>
<xml_diff>
--- a/New_personas.pptx
+++ b/New_personas.pptx
@@ -827,10 +827,6 @@
               </a:spcAft>
               <a:buNone/>
             </a:pPr>
-            <a:r>
-              <a:rPr lang="en" dirty="0"/>
-              <a:t>Neil</a:t>
-            </a:r>
             <a:endParaRPr dirty="0"/>
           </a:p>
         </p:txBody>
@@ -5673,20 +5669,6 @@
             </a:endParaRPr>
           </a:p>
           <a:p>
-            <a:r>
-              <a:rPr lang="en" sz="1333" dirty="0">
-                <a:solidFill>
-                  <a:srgbClr val="00297F"/>
-                </a:solidFill>
-                <a:latin typeface="Lato"/>
-                <a:ea typeface="Lato"/>
-                <a:cs typeface="Lato"/>
-                <a:sym typeface="Lato"/>
-              </a:rPr>
-              <a:t>Bar chart  - top 4 or 5</a:t>
-            </a:r>
-          </a:p>
-          <a:p>
             <a:endParaRPr lang="en" sz="1333" dirty="0">
               <a:solidFill>
                 <a:srgbClr val="00297F"/>
@@ -6159,20 +6141,6 @@
             </a:endParaRPr>
           </a:p>
           <a:p>
-            <a:r>
-              <a:rPr lang="en-US" sz="1333" dirty="0">
-                <a:solidFill>
-                  <a:srgbClr val="00297F"/>
-                </a:solidFill>
-                <a:latin typeface="Lato"/>
-                <a:ea typeface="Lato"/>
-                <a:cs typeface="Lato"/>
-                <a:sym typeface="Lato"/>
-              </a:rPr>
-              <a:t>Bar chart 4 -5 top subjects or bullet points</a:t>
-            </a:r>
-          </a:p>
-          <a:p>
             <a:endParaRPr lang="en-US" sz="1333" dirty="0">
               <a:solidFill>
                 <a:srgbClr val="00297F"/>
@@ -6284,20 +6252,6 @@
               <a:cs typeface="Lato"/>
               <a:sym typeface="Lato"/>
             </a:endParaRPr>
-          </a:p>
-          <a:p>
-            <a:r>
-              <a:rPr lang="en-US" sz="1333" dirty="0">
-                <a:solidFill>
-                  <a:srgbClr val="00297F"/>
-                </a:solidFill>
-                <a:latin typeface="Lato"/>
-                <a:ea typeface="Lato"/>
-                <a:cs typeface="Lato"/>
-                <a:sym typeface="Lato"/>
-              </a:rPr>
-              <a:t>Bar chart 4 -5 top subjects or bullet points</a:t>
-            </a:r>
           </a:p>
           <a:p>
             <a:endParaRPr lang="en-US" sz="1333" dirty="0">

</xml_diff>

<commit_message>
added new viz functions
</commit_message>
<xml_diff>
--- a/New_personas.pptx
+++ b/New_personas.pptx
@@ -213,7 +213,7 @@
           <a:p>
             <a:fld id="{6E2FCC2E-2193-EA4F-B860-60348B945EE0}" type="datetimeFigureOut">
               <a:rPr lang="en-US" smtClean="0"/>
-              <a:t>1/24/20</a:t>
+              <a:t>1/27/20</a:t>
             </a:fld>
             <a:endParaRPr lang="en-US"/>
           </a:p>
@@ -1104,7 +1104,7 @@
           <a:p>
             <a:fld id="{EDF3D89A-7EEA-744A-8EAC-545E5C7F118B}" type="datetimeFigureOut">
               <a:rPr lang="en-US" smtClean="0"/>
-              <a:t>1/24/20</a:t>
+              <a:t>1/27/20</a:t>
             </a:fld>
             <a:endParaRPr lang="en-US"/>
           </a:p>
@@ -1302,7 +1302,7 @@
           <a:p>
             <a:fld id="{EDF3D89A-7EEA-744A-8EAC-545E5C7F118B}" type="datetimeFigureOut">
               <a:rPr lang="en-US" smtClean="0"/>
-              <a:t>1/24/20</a:t>
+              <a:t>1/27/20</a:t>
             </a:fld>
             <a:endParaRPr lang="en-US"/>
           </a:p>
@@ -1510,7 +1510,7 @@
           <a:p>
             <a:fld id="{EDF3D89A-7EEA-744A-8EAC-545E5C7F118B}" type="datetimeFigureOut">
               <a:rPr lang="en-US" smtClean="0"/>
-              <a:t>1/24/20</a:t>
+              <a:t>1/27/20</a:t>
             </a:fld>
             <a:endParaRPr lang="en-US"/>
           </a:p>
@@ -1853,7 +1853,7 @@
           <a:p>
             <a:fld id="{EDF3D89A-7EEA-744A-8EAC-545E5C7F118B}" type="datetimeFigureOut">
               <a:rPr lang="en-US" smtClean="0"/>
-              <a:t>1/24/20</a:t>
+              <a:t>1/27/20</a:t>
             </a:fld>
             <a:endParaRPr lang="en-US"/>
           </a:p>
@@ -2128,7 +2128,7 @@
           <a:p>
             <a:fld id="{EDF3D89A-7EEA-744A-8EAC-545E5C7F118B}" type="datetimeFigureOut">
               <a:rPr lang="en-US" smtClean="0"/>
-              <a:t>1/24/20</a:t>
+              <a:t>1/27/20</a:t>
             </a:fld>
             <a:endParaRPr lang="en-US"/>
           </a:p>
@@ -2393,7 +2393,7 @@
           <a:p>
             <a:fld id="{EDF3D89A-7EEA-744A-8EAC-545E5C7F118B}" type="datetimeFigureOut">
               <a:rPr lang="en-US" smtClean="0"/>
-              <a:t>1/24/20</a:t>
+              <a:t>1/27/20</a:t>
             </a:fld>
             <a:endParaRPr lang="en-US"/>
           </a:p>
@@ -2805,7 +2805,7 @@
           <a:p>
             <a:fld id="{EDF3D89A-7EEA-744A-8EAC-545E5C7F118B}" type="datetimeFigureOut">
               <a:rPr lang="en-US" smtClean="0"/>
-              <a:t>1/24/20</a:t>
+              <a:t>1/27/20</a:t>
             </a:fld>
             <a:endParaRPr lang="en-US"/>
           </a:p>
@@ -2946,7 +2946,7 @@
           <a:p>
             <a:fld id="{EDF3D89A-7EEA-744A-8EAC-545E5C7F118B}" type="datetimeFigureOut">
               <a:rPr lang="en-US" smtClean="0"/>
-              <a:t>1/24/20</a:t>
+              <a:t>1/27/20</a:t>
             </a:fld>
             <a:endParaRPr lang="en-US"/>
           </a:p>
@@ -3059,7 +3059,7 @@
           <a:p>
             <a:fld id="{EDF3D89A-7EEA-744A-8EAC-545E5C7F118B}" type="datetimeFigureOut">
               <a:rPr lang="en-US" smtClean="0"/>
-              <a:t>1/24/20</a:t>
+              <a:t>1/27/20</a:t>
             </a:fld>
             <a:endParaRPr lang="en-US"/>
           </a:p>
@@ -3370,7 +3370,7 @@
           <a:p>
             <a:fld id="{EDF3D89A-7EEA-744A-8EAC-545E5C7F118B}" type="datetimeFigureOut">
               <a:rPr lang="en-US" smtClean="0"/>
-              <a:t>1/24/20</a:t>
+              <a:t>1/27/20</a:t>
             </a:fld>
             <a:endParaRPr lang="en-US"/>
           </a:p>
@@ -3658,7 +3658,7 @@
           <a:p>
             <a:fld id="{EDF3D89A-7EEA-744A-8EAC-545E5C7F118B}" type="datetimeFigureOut">
               <a:rPr lang="en-US" smtClean="0"/>
-              <a:t>1/24/20</a:t>
+              <a:t>1/27/20</a:t>
             </a:fld>
             <a:endParaRPr lang="en-US"/>
           </a:p>
@@ -3899,7 +3899,7 @@
           <a:p>
             <a:fld id="{EDF3D89A-7EEA-744A-8EAC-545E5C7F118B}" type="datetimeFigureOut">
               <a:rPr lang="en-US" smtClean="0"/>
-              <a:t>1/24/20</a:t>
+              <a:t>1/27/20</a:t>
             </a:fld>
             <a:endParaRPr lang="en-US"/>
           </a:p>
@@ -6650,6 +6650,305 @@
           <a:chExt cx="0" cy="0"/>
         </a:xfrm>
       </p:grpSpPr>
+      <p:sp>
+        <p:nvSpPr>
+          <p:cNvPr id="330" name="Google Shape;330;p36"/>
+          <p:cNvSpPr txBox="1"/>
+          <p:nvPr/>
+        </p:nvSpPr>
+        <p:spPr>
+          <a:xfrm>
+            <a:off x="144767" y="1079500"/>
+            <a:ext cx="2944600" cy="5520799"/>
+          </a:xfrm>
+          <a:prstGeom prst="rect">
+            <a:avLst/>
+          </a:prstGeom>
+          <a:noFill/>
+          <a:ln>
+            <a:noFill/>
+          </a:ln>
+        </p:spPr>
+        <p:txBody>
+          <a:bodyPr spcFirstLastPara="1" wrap="square" lIns="121900" tIns="121900" rIns="121900" bIns="121900" anchor="t" anchorCtr="0">
+            <a:noAutofit/>
+          </a:bodyPr>
+          <a:lstStyle/>
+          <a:p>
+            <a:r>
+              <a:rPr lang="en-US" sz="1333" b="1" dirty="0">
+                <a:solidFill>
+                  <a:srgbClr val="00297F"/>
+                </a:solidFill>
+                <a:latin typeface="Lato"/>
+                <a:ea typeface="Lato"/>
+                <a:cs typeface="Lato"/>
+                <a:sym typeface="Lato"/>
+              </a:rPr>
+              <a:t>Industry</a:t>
+            </a:r>
+          </a:p>
+          <a:p>
+            <a:endParaRPr lang="en" sz="1333" dirty="0">
+              <a:solidFill>
+                <a:srgbClr val="00297F"/>
+              </a:solidFill>
+              <a:latin typeface="Lato"/>
+              <a:ea typeface="Lato"/>
+              <a:cs typeface="Lato"/>
+              <a:sym typeface="Lato"/>
+            </a:endParaRPr>
+          </a:p>
+          <a:p>
+            <a:endParaRPr lang="en" sz="1333" dirty="0">
+              <a:solidFill>
+                <a:srgbClr val="00297F"/>
+              </a:solidFill>
+              <a:latin typeface="Lato"/>
+              <a:ea typeface="Lato"/>
+              <a:cs typeface="Lato"/>
+              <a:sym typeface="Lato"/>
+            </a:endParaRPr>
+          </a:p>
+          <a:p>
+            <a:endParaRPr lang="en" sz="1333" dirty="0">
+              <a:solidFill>
+                <a:srgbClr val="00297F"/>
+              </a:solidFill>
+              <a:latin typeface="Lato"/>
+              <a:ea typeface="Lato"/>
+              <a:cs typeface="Lato"/>
+              <a:sym typeface="Lato"/>
+            </a:endParaRPr>
+          </a:p>
+          <a:p>
+            <a:endParaRPr lang="en" sz="1333" dirty="0">
+              <a:solidFill>
+                <a:srgbClr val="00297F"/>
+              </a:solidFill>
+              <a:latin typeface="Lato"/>
+              <a:ea typeface="Lato"/>
+              <a:cs typeface="Lato"/>
+              <a:sym typeface="Lato"/>
+            </a:endParaRPr>
+          </a:p>
+          <a:p>
+            <a:endParaRPr lang="en" sz="1333" dirty="0">
+              <a:solidFill>
+                <a:srgbClr val="00297F"/>
+              </a:solidFill>
+              <a:latin typeface="Lato"/>
+              <a:ea typeface="Lato"/>
+              <a:cs typeface="Lato"/>
+              <a:sym typeface="Lato"/>
+            </a:endParaRPr>
+          </a:p>
+          <a:p>
+            <a:endParaRPr lang="en" sz="1333" dirty="0">
+              <a:solidFill>
+                <a:srgbClr val="00297F"/>
+              </a:solidFill>
+              <a:latin typeface="Lato"/>
+              <a:ea typeface="Lato"/>
+              <a:cs typeface="Lato"/>
+              <a:sym typeface="Lato"/>
+            </a:endParaRPr>
+          </a:p>
+          <a:p>
+            <a:endParaRPr lang="en-US" sz="1333" b="1" dirty="0">
+              <a:solidFill>
+                <a:srgbClr val="00297F"/>
+              </a:solidFill>
+              <a:latin typeface="Lato"/>
+              <a:ea typeface="Lato"/>
+              <a:cs typeface="Lato"/>
+              <a:sym typeface="Lato"/>
+            </a:endParaRPr>
+          </a:p>
+          <a:p>
+            <a:endParaRPr lang="en-US" sz="1333" b="1" dirty="0">
+              <a:solidFill>
+                <a:srgbClr val="00297F"/>
+              </a:solidFill>
+              <a:latin typeface="Lato"/>
+              <a:ea typeface="Lato"/>
+              <a:cs typeface="Lato"/>
+              <a:sym typeface="Lato"/>
+            </a:endParaRPr>
+          </a:p>
+          <a:p>
+            <a:endParaRPr lang="en-US" sz="1333" b="1" dirty="0">
+              <a:solidFill>
+                <a:srgbClr val="00297F"/>
+              </a:solidFill>
+              <a:latin typeface="Lato"/>
+              <a:ea typeface="Lato"/>
+              <a:cs typeface="Lato"/>
+              <a:sym typeface="Lato"/>
+            </a:endParaRPr>
+          </a:p>
+          <a:p>
+            <a:endParaRPr lang="en-US" sz="1333" b="1" dirty="0">
+              <a:solidFill>
+                <a:srgbClr val="00297F"/>
+              </a:solidFill>
+              <a:latin typeface="Lato"/>
+              <a:ea typeface="Lato"/>
+              <a:cs typeface="Lato"/>
+              <a:sym typeface="Lato"/>
+            </a:endParaRPr>
+          </a:p>
+          <a:p>
+            <a:r>
+              <a:rPr lang="en-US" sz="1333" b="1" dirty="0">
+                <a:solidFill>
+                  <a:srgbClr val="00297F"/>
+                </a:solidFill>
+                <a:latin typeface="Lato"/>
+                <a:ea typeface="Lato"/>
+                <a:cs typeface="Lato"/>
+                <a:sym typeface="Lato"/>
+              </a:rPr>
+              <a:t>Title</a:t>
+            </a:r>
+          </a:p>
+          <a:p>
+            <a:endParaRPr lang="en-US" sz="1333" dirty="0">
+              <a:solidFill>
+                <a:srgbClr val="00297F"/>
+              </a:solidFill>
+              <a:latin typeface="Lato"/>
+              <a:ea typeface="Lato"/>
+              <a:cs typeface="Lato"/>
+              <a:sym typeface="Lato"/>
+            </a:endParaRPr>
+          </a:p>
+          <a:p>
+            <a:endParaRPr lang="en-US" sz="1333" dirty="0">
+              <a:solidFill>
+                <a:srgbClr val="00297F"/>
+              </a:solidFill>
+              <a:latin typeface="Lato"/>
+              <a:ea typeface="Lato"/>
+              <a:cs typeface="Lato"/>
+              <a:sym typeface="Lato"/>
+            </a:endParaRPr>
+          </a:p>
+          <a:p>
+            <a:endParaRPr lang="en-US" sz="1333" dirty="0">
+              <a:solidFill>
+                <a:srgbClr val="00297F"/>
+              </a:solidFill>
+              <a:latin typeface="Lato"/>
+              <a:ea typeface="Lato"/>
+              <a:cs typeface="Lato"/>
+              <a:sym typeface="Lato"/>
+            </a:endParaRPr>
+          </a:p>
+          <a:p>
+            <a:endParaRPr lang="en-US" sz="1333" dirty="0">
+              <a:solidFill>
+                <a:srgbClr val="00297F"/>
+              </a:solidFill>
+              <a:latin typeface="Lato"/>
+              <a:ea typeface="Lato"/>
+              <a:cs typeface="Lato"/>
+              <a:sym typeface="Lato"/>
+            </a:endParaRPr>
+          </a:p>
+          <a:p>
+            <a:endParaRPr lang="en-US" sz="1333" dirty="0">
+              <a:solidFill>
+                <a:srgbClr val="00297F"/>
+              </a:solidFill>
+              <a:latin typeface="Lato"/>
+              <a:ea typeface="Lato"/>
+              <a:cs typeface="Lato"/>
+              <a:sym typeface="Lato"/>
+            </a:endParaRPr>
+          </a:p>
+          <a:p>
+            <a:endParaRPr lang="en-US" sz="1333" dirty="0">
+              <a:solidFill>
+                <a:srgbClr val="00297F"/>
+              </a:solidFill>
+              <a:latin typeface="Lato"/>
+              <a:ea typeface="Lato"/>
+              <a:cs typeface="Lato"/>
+              <a:sym typeface="Lato"/>
+            </a:endParaRPr>
+          </a:p>
+          <a:p>
+            <a:endParaRPr lang="en-US" sz="1333" dirty="0">
+              <a:solidFill>
+                <a:srgbClr val="00297F"/>
+              </a:solidFill>
+              <a:latin typeface="Lato"/>
+              <a:ea typeface="Lato"/>
+              <a:cs typeface="Lato"/>
+              <a:sym typeface="Lato"/>
+            </a:endParaRPr>
+          </a:p>
+          <a:p>
+            <a:endParaRPr lang="en-US" sz="1333" b="1" dirty="0">
+              <a:solidFill>
+                <a:srgbClr val="00297F"/>
+              </a:solidFill>
+              <a:latin typeface="Lato"/>
+              <a:ea typeface="Lato"/>
+              <a:cs typeface="Lato"/>
+              <a:sym typeface="Lato"/>
+            </a:endParaRPr>
+          </a:p>
+          <a:p>
+            <a:endParaRPr lang="en-US" sz="1333" b="1" dirty="0">
+              <a:solidFill>
+                <a:srgbClr val="00297F"/>
+              </a:solidFill>
+              <a:latin typeface="Lato"/>
+              <a:ea typeface="Lato"/>
+              <a:cs typeface="Lato"/>
+              <a:sym typeface="Lato"/>
+            </a:endParaRPr>
+          </a:p>
+          <a:p>
+            <a:r>
+              <a:rPr lang="en-US" sz="1333" b="1" dirty="0">
+                <a:solidFill>
+                  <a:srgbClr val="00297F"/>
+                </a:solidFill>
+                <a:latin typeface="Lato"/>
+                <a:ea typeface="Lato"/>
+                <a:cs typeface="Lato"/>
+                <a:sym typeface="Lato"/>
+              </a:rPr>
+              <a:t>Academic training in research</a:t>
+            </a:r>
+          </a:p>
+          <a:p>
+            <a:endParaRPr sz="1333" dirty="0">
+              <a:solidFill>
+                <a:srgbClr val="00297F"/>
+              </a:solidFill>
+              <a:latin typeface="Lato"/>
+              <a:ea typeface="Lato"/>
+              <a:cs typeface="Lato"/>
+              <a:sym typeface="Lato"/>
+            </a:endParaRPr>
+          </a:p>
+          <a:p>
+            <a:endParaRPr sz="1333" dirty="0">
+              <a:solidFill>
+                <a:srgbClr val="00297F"/>
+              </a:solidFill>
+              <a:latin typeface="Lato"/>
+              <a:ea typeface="Lato"/>
+              <a:cs typeface="Lato"/>
+              <a:sym typeface="Lato"/>
+            </a:endParaRPr>
+          </a:p>
+        </p:txBody>
+      </p:sp>
       <p:pic>
         <p:nvPicPr>
           <p:cNvPr id="9" name="Picture 8" descr="A screenshot of a cell phone&#10;&#10;Description automatically generated">
@@ -6702,7 +7001,7 @@
         </p:blipFill>
         <p:spPr>
           <a:xfrm>
-            <a:off x="-411480" y="3493008"/>
+            <a:off x="-444802" y="3445619"/>
             <a:ext cx="3474720" cy="2157984"/>
           </a:xfrm>
           <a:prstGeom prst="rect">
@@ -6790,328 +7089,6 @@
       </p:sp>
       <p:sp>
         <p:nvSpPr>
-          <p:cNvPr id="330" name="Google Shape;330;p36"/>
-          <p:cNvSpPr txBox="1"/>
-          <p:nvPr/>
-        </p:nvSpPr>
-        <p:spPr>
-          <a:xfrm>
-            <a:off x="144767" y="1079500"/>
-            <a:ext cx="2944600" cy="5520799"/>
-          </a:xfrm>
-          <a:prstGeom prst="rect">
-            <a:avLst/>
-          </a:prstGeom>
-          <a:noFill/>
-          <a:ln>
-            <a:noFill/>
-          </a:ln>
-        </p:spPr>
-        <p:txBody>
-          <a:bodyPr spcFirstLastPara="1" wrap="square" lIns="121900" tIns="121900" rIns="121900" bIns="121900" anchor="t" anchorCtr="0">
-            <a:noAutofit/>
-          </a:bodyPr>
-          <a:lstStyle/>
-          <a:p>
-            <a:r>
-              <a:rPr lang="en-US" sz="1333" b="1" dirty="0">
-                <a:solidFill>
-                  <a:srgbClr val="00297F"/>
-                </a:solidFill>
-                <a:latin typeface="Lato"/>
-                <a:ea typeface="Lato"/>
-                <a:cs typeface="Lato"/>
-                <a:sym typeface="Lato"/>
-              </a:rPr>
-              <a:t>Industry</a:t>
-            </a:r>
-          </a:p>
-          <a:p>
-            <a:endParaRPr lang="en" sz="1333" dirty="0">
-              <a:solidFill>
-                <a:srgbClr val="00297F"/>
-              </a:solidFill>
-              <a:latin typeface="Lato"/>
-              <a:ea typeface="Lato"/>
-              <a:cs typeface="Lato"/>
-              <a:sym typeface="Lato"/>
-            </a:endParaRPr>
-          </a:p>
-          <a:p>
-            <a:r>
-              <a:rPr lang="en" sz="1333" dirty="0">
-                <a:solidFill>
-                  <a:srgbClr val="00297F"/>
-                </a:solidFill>
-                <a:latin typeface="Lato"/>
-                <a:ea typeface="Lato"/>
-                <a:cs typeface="Lato"/>
-                <a:sym typeface="Lato"/>
-              </a:rPr>
-              <a:t>Bar chart  - top 4 or 5</a:t>
-            </a:r>
-          </a:p>
-          <a:p>
-            <a:endParaRPr lang="en" sz="1333" dirty="0">
-              <a:solidFill>
-                <a:srgbClr val="00297F"/>
-              </a:solidFill>
-              <a:latin typeface="Lato"/>
-              <a:ea typeface="Lato"/>
-              <a:cs typeface="Lato"/>
-              <a:sym typeface="Lato"/>
-            </a:endParaRPr>
-          </a:p>
-          <a:p>
-            <a:endParaRPr lang="en" sz="1333" dirty="0">
-              <a:solidFill>
-                <a:srgbClr val="00297F"/>
-              </a:solidFill>
-              <a:latin typeface="Lato"/>
-              <a:ea typeface="Lato"/>
-              <a:cs typeface="Lato"/>
-              <a:sym typeface="Lato"/>
-            </a:endParaRPr>
-          </a:p>
-          <a:p>
-            <a:endParaRPr lang="en" sz="1333" dirty="0">
-              <a:solidFill>
-                <a:srgbClr val="00297F"/>
-              </a:solidFill>
-              <a:latin typeface="Lato"/>
-              <a:ea typeface="Lato"/>
-              <a:cs typeface="Lato"/>
-              <a:sym typeface="Lato"/>
-            </a:endParaRPr>
-          </a:p>
-          <a:p>
-            <a:endParaRPr lang="en" sz="1333" dirty="0">
-              <a:solidFill>
-                <a:srgbClr val="00297F"/>
-              </a:solidFill>
-              <a:latin typeface="Lato"/>
-              <a:ea typeface="Lato"/>
-              <a:cs typeface="Lato"/>
-              <a:sym typeface="Lato"/>
-            </a:endParaRPr>
-          </a:p>
-          <a:p>
-            <a:r>
-              <a:rPr lang="en" sz="1333" b="1" dirty="0">
-                <a:solidFill>
-                  <a:srgbClr val="00297F"/>
-                </a:solidFill>
-                <a:latin typeface="Lato"/>
-                <a:ea typeface="Lato"/>
-                <a:cs typeface="Lato"/>
-                <a:sym typeface="Lato"/>
-              </a:rPr>
-              <a:t>Size</a:t>
-            </a:r>
-          </a:p>
-          <a:p>
-            <a:endParaRPr lang="en-US" sz="1333" b="1" dirty="0">
-              <a:solidFill>
-                <a:srgbClr val="00297F"/>
-              </a:solidFill>
-              <a:latin typeface="Lato"/>
-              <a:ea typeface="Lato"/>
-              <a:cs typeface="Lato"/>
-              <a:sym typeface="Lato"/>
-            </a:endParaRPr>
-          </a:p>
-          <a:p>
-            <a:r>
-              <a:rPr lang="en-US" sz="1333" dirty="0">
-                <a:solidFill>
-                  <a:srgbClr val="00297F"/>
-                </a:solidFill>
-                <a:latin typeface="Lato"/>
-                <a:ea typeface="Lato"/>
-                <a:cs typeface="Lato"/>
-                <a:sym typeface="Lato"/>
-              </a:rPr>
-              <a:t>100% stacked bar chart</a:t>
-            </a:r>
-          </a:p>
-          <a:p>
-            <a:endParaRPr lang="en-US" sz="1333" b="1" dirty="0">
-              <a:solidFill>
-                <a:srgbClr val="00297F"/>
-              </a:solidFill>
-              <a:latin typeface="Lato"/>
-              <a:ea typeface="Lato"/>
-              <a:cs typeface="Lato"/>
-              <a:sym typeface="Lato"/>
-            </a:endParaRPr>
-          </a:p>
-          <a:p>
-            <a:endParaRPr lang="en-US" sz="1333" b="1" dirty="0">
-              <a:solidFill>
-                <a:srgbClr val="00297F"/>
-              </a:solidFill>
-              <a:latin typeface="Lato"/>
-              <a:ea typeface="Lato"/>
-              <a:cs typeface="Lato"/>
-              <a:sym typeface="Lato"/>
-            </a:endParaRPr>
-          </a:p>
-          <a:p>
-            <a:r>
-              <a:rPr lang="en-US" sz="1333" b="1" dirty="0">
-                <a:solidFill>
-                  <a:srgbClr val="00297F"/>
-                </a:solidFill>
-                <a:latin typeface="Lato"/>
-                <a:ea typeface="Lato"/>
-                <a:cs typeface="Lato"/>
-                <a:sym typeface="Lato"/>
-              </a:rPr>
-              <a:t>Title</a:t>
-            </a:r>
-          </a:p>
-          <a:p>
-            <a:endParaRPr lang="en-US" sz="1333" dirty="0">
-              <a:solidFill>
-                <a:srgbClr val="00297F"/>
-              </a:solidFill>
-              <a:latin typeface="Lato"/>
-              <a:ea typeface="Lato"/>
-              <a:cs typeface="Lato"/>
-              <a:sym typeface="Lato"/>
-            </a:endParaRPr>
-          </a:p>
-          <a:p>
-            <a:r>
-              <a:rPr lang="en-US" sz="1333" dirty="0">
-                <a:solidFill>
-                  <a:srgbClr val="00297F"/>
-                </a:solidFill>
-                <a:latin typeface="Lato"/>
-                <a:ea typeface="Lato"/>
-                <a:cs typeface="Lato"/>
-                <a:sym typeface="Lato"/>
-              </a:rPr>
-              <a:t>Bar chart – top 4 or 5</a:t>
-            </a:r>
-          </a:p>
-          <a:p>
-            <a:endParaRPr lang="en-US" sz="1333" dirty="0">
-              <a:solidFill>
-                <a:srgbClr val="00297F"/>
-              </a:solidFill>
-              <a:latin typeface="Lato"/>
-              <a:ea typeface="Lato"/>
-              <a:cs typeface="Lato"/>
-              <a:sym typeface="Lato"/>
-            </a:endParaRPr>
-          </a:p>
-          <a:p>
-            <a:endParaRPr lang="en-US" sz="1333" dirty="0">
-              <a:solidFill>
-                <a:srgbClr val="00297F"/>
-              </a:solidFill>
-              <a:latin typeface="Lato"/>
-              <a:ea typeface="Lato"/>
-              <a:cs typeface="Lato"/>
-              <a:sym typeface="Lato"/>
-            </a:endParaRPr>
-          </a:p>
-          <a:p>
-            <a:endParaRPr lang="en-US" sz="1333" dirty="0">
-              <a:solidFill>
-                <a:srgbClr val="00297F"/>
-              </a:solidFill>
-              <a:latin typeface="Lato"/>
-              <a:ea typeface="Lato"/>
-              <a:cs typeface="Lato"/>
-              <a:sym typeface="Lato"/>
-            </a:endParaRPr>
-          </a:p>
-          <a:p>
-            <a:endParaRPr lang="en-US" sz="1333" dirty="0">
-              <a:solidFill>
-                <a:srgbClr val="00297F"/>
-              </a:solidFill>
-              <a:latin typeface="Lato"/>
-              <a:ea typeface="Lato"/>
-              <a:cs typeface="Lato"/>
-              <a:sym typeface="Lato"/>
-            </a:endParaRPr>
-          </a:p>
-          <a:p>
-            <a:endParaRPr lang="en-US" sz="1333" dirty="0">
-              <a:solidFill>
-                <a:srgbClr val="00297F"/>
-              </a:solidFill>
-              <a:latin typeface="Lato"/>
-              <a:ea typeface="Lato"/>
-              <a:cs typeface="Lato"/>
-              <a:sym typeface="Lato"/>
-            </a:endParaRPr>
-          </a:p>
-          <a:p>
-            <a:endParaRPr lang="en-US" sz="1333" b="1" dirty="0">
-              <a:solidFill>
-                <a:srgbClr val="00297F"/>
-              </a:solidFill>
-              <a:latin typeface="Lato"/>
-              <a:ea typeface="Lato"/>
-              <a:cs typeface="Lato"/>
-              <a:sym typeface="Lato"/>
-            </a:endParaRPr>
-          </a:p>
-          <a:p>
-            <a:endParaRPr lang="en-US" sz="1333" b="1" dirty="0">
-              <a:solidFill>
-                <a:srgbClr val="00297F"/>
-              </a:solidFill>
-              <a:latin typeface="Lato"/>
-              <a:ea typeface="Lato"/>
-              <a:cs typeface="Lato"/>
-              <a:sym typeface="Lato"/>
-            </a:endParaRPr>
-          </a:p>
-          <a:p>
-            <a:r>
-              <a:rPr lang="en-US" sz="1333" b="1" dirty="0">
-                <a:solidFill>
-                  <a:srgbClr val="00297F"/>
-                </a:solidFill>
-                <a:latin typeface="Lato"/>
-                <a:ea typeface="Lato"/>
-                <a:cs typeface="Lato"/>
-                <a:sym typeface="Lato"/>
-              </a:rPr>
-              <a:t>Academic training in research</a:t>
-            </a:r>
-          </a:p>
-          <a:p>
-            <a:endParaRPr sz="1333" dirty="0">
-              <a:solidFill>
-                <a:srgbClr val="00297F"/>
-              </a:solidFill>
-              <a:latin typeface="Lato"/>
-              <a:ea typeface="Lato"/>
-              <a:cs typeface="Lato"/>
-              <a:sym typeface="Lato"/>
-            </a:endParaRPr>
-          </a:p>
-          <a:p>
-            <a:endParaRPr sz="1333" dirty="0">
-              <a:solidFill>
-                <a:srgbClr val="00297F"/>
-              </a:solidFill>
-              <a:latin typeface="Lato"/>
-              <a:ea typeface="Lato"/>
-              <a:cs typeface="Lato"/>
-              <a:sym typeface="Lato"/>
-            </a:endParaRPr>
-          </a:p>
-        </p:txBody>
-      </p:sp>
-      <p:sp>
-        <p:nvSpPr>
           <p:cNvPr id="331" name="Google Shape;331;p36"/>
           <p:cNvSpPr txBox="1"/>
           <p:nvPr/>
@@ -7169,20 +7146,6 @@
             </a:endParaRPr>
           </a:p>
           <a:p>
-            <a:r>
-              <a:rPr lang="en-US" sz="1333" dirty="0">
-                <a:solidFill>
-                  <a:srgbClr val="00297F"/>
-                </a:solidFill>
-                <a:latin typeface="Lato"/>
-                <a:ea typeface="Lato"/>
-                <a:cs typeface="Lato"/>
-                <a:sym typeface="Lato"/>
-              </a:rPr>
-              <a:t>Bar chart 4 -5 top subjects or bullet points</a:t>
-            </a:r>
-          </a:p>
-          <a:p>
             <a:endParaRPr lang="en-US" sz="1333" dirty="0">
               <a:solidFill>
                 <a:srgbClr val="00297F"/>
@@ -7194,6 +7157,28 @@
             </a:endParaRPr>
           </a:p>
           <a:p>
+            <a:endParaRPr lang="en-US" sz="1333" dirty="0">
+              <a:solidFill>
+                <a:srgbClr val="00297F"/>
+              </a:solidFill>
+              <a:latin typeface="Lato"/>
+              <a:ea typeface="Lato"/>
+              <a:cs typeface="Lato"/>
+              <a:sym typeface="Lato"/>
+            </a:endParaRPr>
+          </a:p>
+          <a:p>
+            <a:endParaRPr lang="en-US" sz="1333" dirty="0">
+              <a:solidFill>
+                <a:srgbClr val="00297F"/>
+              </a:solidFill>
+              <a:latin typeface="Lato"/>
+              <a:ea typeface="Lato"/>
+              <a:cs typeface="Lato"/>
+              <a:sym typeface="Lato"/>
+            </a:endParaRPr>
+          </a:p>
+          <a:p>
             <a:endParaRPr lang="en-US" sz="1333" b="1" dirty="0">
               <a:solidFill>
                 <a:srgbClr val="00297F"/>
@@ -7227,7 +7212,7 @@
             </a:endParaRPr>
           </a:p>
           <a:p>
-            <a:endParaRPr lang="en" sz="1333" b="1" dirty="0">
+            <a:endParaRPr lang="en" sz="1050" b="1" dirty="0">
               <a:solidFill>
                 <a:srgbClr val="00297F"/>
               </a:solidFill>
@@ -7285,8 +7270,96 @@
             </a:endParaRPr>
           </a:p>
           <a:p>
-            <a:r>
-              <a:rPr lang="en-US" sz="1333" dirty="0">
+            <a:endParaRPr lang="en-US" sz="1333" dirty="0">
+              <a:solidFill>
+                <a:srgbClr val="00297F"/>
+              </a:solidFill>
+              <a:latin typeface="Lato"/>
+              <a:ea typeface="Lato"/>
+              <a:cs typeface="Lato"/>
+              <a:sym typeface="Lato"/>
+            </a:endParaRPr>
+          </a:p>
+          <a:p>
+            <a:endParaRPr lang="en-US" sz="1333" dirty="0">
+              <a:solidFill>
+                <a:srgbClr val="00297F"/>
+              </a:solidFill>
+              <a:latin typeface="Lato"/>
+              <a:ea typeface="Lato"/>
+              <a:cs typeface="Lato"/>
+              <a:sym typeface="Lato"/>
+            </a:endParaRPr>
+          </a:p>
+          <a:p>
+            <a:endParaRPr lang="en-US" sz="1333" dirty="0">
+              <a:solidFill>
+                <a:srgbClr val="00297F"/>
+              </a:solidFill>
+              <a:latin typeface="Lato"/>
+              <a:ea typeface="Lato"/>
+              <a:cs typeface="Lato"/>
+              <a:sym typeface="Lato"/>
+            </a:endParaRPr>
+          </a:p>
+          <a:p>
+            <a:endParaRPr lang="en-US" sz="1333" dirty="0">
+              <a:solidFill>
+                <a:srgbClr val="00297F"/>
+              </a:solidFill>
+              <a:latin typeface="Lato"/>
+              <a:ea typeface="Lato"/>
+              <a:cs typeface="Lato"/>
+              <a:sym typeface="Lato"/>
+            </a:endParaRPr>
+          </a:p>
+          <a:p>
+            <a:endParaRPr lang="en-US" sz="1333" dirty="0">
+              <a:solidFill>
+                <a:srgbClr val="00297F"/>
+              </a:solidFill>
+              <a:latin typeface="Lato"/>
+              <a:ea typeface="Lato"/>
+              <a:cs typeface="Lato"/>
+              <a:sym typeface="Lato"/>
+            </a:endParaRPr>
+          </a:p>
+          <a:p>
+            <a:endParaRPr lang="en-US" sz="1333" dirty="0">
+              <a:solidFill>
+                <a:srgbClr val="00297F"/>
+              </a:solidFill>
+              <a:latin typeface="Lato"/>
+              <a:ea typeface="Lato"/>
+              <a:cs typeface="Lato"/>
+              <a:sym typeface="Lato"/>
+            </a:endParaRPr>
+          </a:p>
+          <a:p>
+            <a:endParaRPr lang="en-US" sz="1333" dirty="0">
+              <a:solidFill>
+                <a:srgbClr val="00297F"/>
+              </a:solidFill>
+              <a:latin typeface="Lato"/>
+              <a:ea typeface="Lato"/>
+              <a:cs typeface="Lato"/>
+              <a:sym typeface="Lato"/>
+            </a:endParaRPr>
+          </a:p>
+          <a:p>
+            <a:endParaRPr lang="en-US" sz="1333" dirty="0">
+              <a:solidFill>
+                <a:srgbClr val="00297F"/>
+              </a:solidFill>
+              <a:latin typeface="Lato"/>
+              <a:ea typeface="Lato"/>
+              <a:cs typeface="Lato"/>
+              <a:sym typeface="Lato"/>
+            </a:endParaRPr>
+          </a:p>
+          <a:p>
+            <a:r>
+              <a:rPr lang="en" sz="1333" b="1" dirty="0">
                 <a:solidFill>
                   <a:srgbClr val="00297F"/>
                 </a:solidFill>
@@ -7295,7 +7368,7 @@
                 <a:cs typeface="Lato"/>
                 <a:sym typeface="Lato"/>
               </a:rPr>
-              <a:t>Bar chart 4 -5 top subjects or bullet points</a:t>
+              <a:t>Size</a:t>
             </a:r>
           </a:p>
           <a:p>
@@ -7820,8 +7893,98 @@
         </p:blipFill>
         <p:spPr>
           <a:xfrm>
-            <a:off x="-411480" y="2926079"/>
+            <a:off x="2928528" y="5861304"/>
             <a:ext cx="3481416" cy="996696"/>
+          </a:xfrm>
+          <a:prstGeom prst="rect">
+            <a:avLst/>
+          </a:prstGeom>
+        </p:spPr>
+      </p:pic>
+      <p:pic>
+        <p:nvPicPr>
+          <p:cNvPr id="4" name="Picture 3" descr="A screenshot of a cell phone&#10;&#10;Description automatically generated">
+            <a:extLst>
+              <a:ext uri="{FF2B5EF4-FFF2-40B4-BE49-F238E27FC236}">
+                <a16:creationId xmlns:a16="http://schemas.microsoft.com/office/drawing/2014/main" id="{03674BE5-5418-AE44-A259-C9F0EF50959D}"/>
+              </a:ext>
+            </a:extLst>
+          </p:cNvPr>
+          <p:cNvPicPr>
+            <a:picLocks noChangeAspect="1"/>
+          </p:cNvPicPr>
+          <p:nvPr/>
+        </p:nvPicPr>
+        <p:blipFill>
+          <a:blip r:embed="rId6"/>
+          <a:stretch>
+            <a:fillRect/>
+          </a:stretch>
+        </p:blipFill>
+        <p:spPr>
+          <a:xfrm>
+            <a:off x="3211538" y="3493008"/>
+            <a:ext cx="3236976" cy="2157984"/>
+          </a:xfrm>
+          <a:prstGeom prst="rect">
+            <a:avLst/>
+          </a:prstGeom>
+        </p:spPr>
+      </p:pic>
+      <p:pic>
+        <p:nvPicPr>
+          <p:cNvPr id="8" name="Picture 7" descr="A screenshot of a cell phone&#10;&#10;Description automatically generated">
+            <a:extLst>
+              <a:ext uri="{FF2B5EF4-FFF2-40B4-BE49-F238E27FC236}">
+                <a16:creationId xmlns:a16="http://schemas.microsoft.com/office/drawing/2014/main" id="{EC36C487-81E2-2847-8730-51EB3F818366}"/>
+              </a:ext>
+            </a:extLst>
+          </p:cNvPr>
+          <p:cNvPicPr>
+            <a:picLocks noChangeAspect="1"/>
+          </p:cNvPicPr>
+          <p:nvPr/>
+        </p:nvPicPr>
+        <p:blipFill>
+          <a:blip r:embed="rId7"/>
+          <a:stretch>
+            <a:fillRect/>
+          </a:stretch>
+        </p:blipFill>
+        <p:spPr>
+          <a:xfrm>
+            <a:off x="-204415" y="1335024"/>
+            <a:ext cx="3236976" cy="2157984"/>
+          </a:xfrm>
+          <a:prstGeom prst="rect">
+            <a:avLst/>
+          </a:prstGeom>
+        </p:spPr>
+      </p:pic>
+      <p:pic>
+        <p:nvPicPr>
+          <p:cNvPr id="11" name="Picture 10" descr="A screenshot of a cell phone&#10;&#10;Description automatically generated">
+            <a:extLst>
+              <a:ext uri="{FF2B5EF4-FFF2-40B4-BE49-F238E27FC236}">
+                <a16:creationId xmlns:a16="http://schemas.microsoft.com/office/drawing/2014/main" id="{0F33C918-682B-2948-AAC4-0AEDC062A631}"/>
+              </a:ext>
+            </a:extLst>
+          </p:cNvPr>
+          <p:cNvPicPr>
+            <a:picLocks noChangeAspect="1"/>
+          </p:cNvPicPr>
+          <p:nvPr/>
+        </p:nvPicPr>
+        <p:blipFill>
+          <a:blip r:embed="rId8"/>
+          <a:stretch>
+            <a:fillRect/>
+          </a:stretch>
+        </p:blipFill>
+        <p:spPr>
+          <a:xfrm>
+            <a:off x="3229980" y="1312418"/>
+            <a:ext cx="3236976" cy="2157984"/>
           </a:xfrm>
           <a:prstGeom prst="rect">
             <a:avLst/>

</xml_diff>